<commit_message>
91173: Various updates and improvements
</commit_message>
<xml_diff>
--- a/content/12phy/as91173/Circuits.pptx
+++ b/content/12phy/as91173/Circuits.pptx
@@ -5,12 +5,13 @@
     <p:sldMasterId id="2147483648" r:id="rId1"/>
   </p:sldMasterIdLst>
   <p:notesMasterIdLst>
-    <p:notesMasterId r:id="rId5"/>
+    <p:notesMasterId r:id="rId6"/>
   </p:notesMasterIdLst>
   <p:sldIdLst>
     <p:sldId id="257" r:id="rId2"/>
     <p:sldId id="258" r:id="rId3"/>
     <p:sldId id="259" r:id="rId4"/>
+    <p:sldId id="260" r:id="rId5"/>
   </p:sldIdLst>
   <p:sldSz cx="12192000" cy="6858000"/>
   <p:notesSz cx="6858000" cy="9144000"/>
@@ -109,6 +110,11 @@
       </a:defRPr>
     </a:lvl9pPr>
   </p:defaultTextStyle>
+  <p:extLst>
+    <p:ext uri="{EFAFB233-063F-42B5-8137-9DF3F51BA10A}">
+      <p15:sldGuideLst xmlns:p15="http://schemas.microsoft.com/office/powerpoint/2012/main"/>
+    </p:ext>
+  </p:extLst>
 </p:presentation>
 </file>
 
@@ -194,7 +200,7 @@
           <a:p>
             <a:fld id="{B7A466D3-1E6A-AF46-AFD8-4B8FB1690381}" type="datetimeFigureOut">
               <a:rPr lang="en-US" smtClean="0"/>
-              <a:t>5/27/22</a:t>
+              <a:t>5/10/23</a:t>
             </a:fld>
             <a:endParaRPr lang="en-US"/>
           </a:p>
@@ -863,7 +869,7 @@
           <a:p>
             <a:fld id="{67261FD3-3482-D84B-9B44-CD816D3AD191}" type="datetimeFigureOut">
               <a:rPr lang="en-US" smtClean="0"/>
-              <a:t>5/27/22</a:t>
+              <a:t>5/10/23</a:t>
             </a:fld>
             <a:endParaRPr lang="en-US"/>
           </a:p>
@@ -1063,7 +1069,7 @@
           <a:p>
             <a:fld id="{67261FD3-3482-D84B-9B44-CD816D3AD191}" type="datetimeFigureOut">
               <a:rPr lang="en-US" smtClean="0"/>
-              <a:t>5/27/22</a:t>
+              <a:t>5/10/23</a:t>
             </a:fld>
             <a:endParaRPr lang="en-US"/>
           </a:p>
@@ -1273,7 +1279,7 @@
           <a:p>
             <a:fld id="{67261FD3-3482-D84B-9B44-CD816D3AD191}" type="datetimeFigureOut">
               <a:rPr lang="en-US" smtClean="0"/>
-              <a:t>5/27/22</a:t>
+              <a:t>5/10/23</a:t>
             </a:fld>
             <a:endParaRPr lang="en-US"/>
           </a:p>
@@ -1473,7 +1479,7 @@
           <a:p>
             <a:fld id="{67261FD3-3482-D84B-9B44-CD816D3AD191}" type="datetimeFigureOut">
               <a:rPr lang="en-US" smtClean="0"/>
-              <a:t>5/27/22</a:t>
+              <a:t>5/10/23</a:t>
             </a:fld>
             <a:endParaRPr lang="en-US"/>
           </a:p>
@@ -1749,7 +1755,7 @@
           <a:p>
             <a:fld id="{67261FD3-3482-D84B-9B44-CD816D3AD191}" type="datetimeFigureOut">
               <a:rPr lang="en-US" smtClean="0"/>
-              <a:t>5/27/22</a:t>
+              <a:t>5/10/23</a:t>
             </a:fld>
             <a:endParaRPr lang="en-US"/>
           </a:p>
@@ -2017,7 +2023,7 @@
           <a:p>
             <a:fld id="{67261FD3-3482-D84B-9B44-CD816D3AD191}" type="datetimeFigureOut">
               <a:rPr lang="en-US" smtClean="0"/>
-              <a:t>5/27/22</a:t>
+              <a:t>5/10/23</a:t>
             </a:fld>
             <a:endParaRPr lang="en-US"/>
           </a:p>
@@ -2432,7 +2438,7 @@
           <a:p>
             <a:fld id="{67261FD3-3482-D84B-9B44-CD816D3AD191}" type="datetimeFigureOut">
               <a:rPr lang="en-US" smtClean="0"/>
-              <a:t>5/27/22</a:t>
+              <a:t>5/10/23</a:t>
             </a:fld>
             <a:endParaRPr lang="en-US"/>
           </a:p>
@@ -2574,7 +2580,7 @@
           <a:p>
             <a:fld id="{67261FD3-3482-D84B-9B44-CD816D3AD191}" type="datetimeFigureOut">
               <a:rPr lang="en-US" smtClean="0"/>
-              <a:t>5/27/22</a:t>
+              <a:t>5/10/23</a:t>
             </a:fld>
             <a:endParaRPr lang="en-US"/>
           </a:p>
@@ -2687,7 +2693,7 @@
           <a:p>
             <a:fld id="{67261FD3-3482-D84B-9B44-CD816D3AD191}" type="datetimeFigureOut">
               <a:rPr lang="en-US" smtClean="0"/>
-              <a:t>5/27/22</a:t>
+              <a:t>5/10/23</a:t>
             </a:fld>
             <a:endParaRPr lang="en-US"/>
           </a:p>
@@ -3000,7 +3006,7 @@
           <a:p>
             <a:fld id="{67261FD3-3482-D84B-9B44-CD816D3AD191}" type="datetimeFigureOut">
               <a:rPr lang="en-US" smtClean="0"/>
-              <a:t>5/27/22</a:t>
+              <a:t>5/10/23</a:t>
             </a:fld>
             <a:endParaRPr lang="en-US"/>
           </a:p>
@@ -3289,7 +3295,7 @@
           <a:p>
             <a:fld id="{67261FD3-3482-D84B-9B44-CD816D3AD191}" type="datetimeFigureOut">
               <a:rPr lang="en-US" smtClean="0"/>
-              <a:t>5/27/22</a:t>
+              <a:t>5/10/23</a:t>
             </a:fld>
             <a:endParaRPr lang="en-US"/>
           </a:p>
@@ -3532,7 +3538,7 @@
           <a:p>
             <a:fld id="{67261FD3-3482-D84B-9B44-CD816D3AD191}" type="datetimeFigureOut">
               <a:rPr lang="en-US" smtClean="0"/>
-              <a:t>5/27/22</a:t>
+              <a:t>5/10/23</a:t>
             </a:fld>
             <a:endParaRPr lang="en-US"/>
           </a:p>
@@ -8585,6 +8591,1046 @@
     <p:extLst>
       <p:ext uri="{BB962C8B-B14F-4D97-AF65-F5344CB8AC3E}">
         <p14:creationId xmlns:p14="http://schemas.microsoft.com/office/powerpoint/2010/main" val="163584581"/>
+      </p:ext>
+    </p:extLst>
+  </p:cSld>
+  <p:clrMapOvr>
+    <a:masterClrMapping/>
+  </p:clrMapOvr>
+</p:sld>
+</file>
+
+<file path=ppt/slides/slide4.xml><?xml version="1.0" encoding="utf-8"?>
+<p:sld xmlns:a="http://schemas.openxmlformats.org/drawingml/2006/main" xmlns:r="http://schemas.openxmlformats.org/officeDocument/2006/relationships" xmlns:p="http://schemas.openxmlformats.org/presentationml/2006/main">
+  <p:cSld>
+    <p:spTree>
+      <p:nvGrpSpPr>
+        <p:cNvPr id="1" name=""/>
+        <p:cNvGrpSpPr/>
+        <p:nvPr/>
+      </p:nvGrpSpPr>
+      <p:grpSpPr>
+        <a:xfrm>
+          <a:off x="0" y="0"/>
+          <a:ext cx="0" cy="0"/>
+          <a:chOff x="0" y="0"/>
+          <a:chExt cx="0" cy="0"/>
+        </a:xfrm>
+      </p:grpSpPr>
+      <p:sp>
+        <p:nvSpPr>
+          <p:cNvPr id="4" name="Rectangle 3">
+            <a:extLst>
+              <a:ext uri="{FF2B5EF4-FFF2-40B4-BE49-F238E27FC236}">
+                <a16:creationId xmlns:a16="http://schemas.microsoft.com/office/drawing/2014/main" id="{23E9C612-5D92-3D05-B8F7-053B02F06BD2}"/>
+              </a:ext>
+            </a:extLst>
+          </p:cNvPr>
+          <p:cNvSpPr/>
+          <p:nvPr/>
+        </p:nvSpPr>
+        <p:spPr>
+          <a:xfrm>
+            <a:off x="3345366" y="769434"/>
+            <a:ext cx="535258" cy="5062654"/>
+          </a:xfrm>
+          <a:prstGeom prst="rect">
+            <a:avLst/>
+          </a:prstGeom>
+          <a:noFill/>
+          <a:ln w="28575">
+            <a:solidFill>
+              <a:schemeClr val="tx1"/>
+            </a:solidFill>
+          </a:ln>
+        </p:spPr>
+        <p:style>
+          <a:lnRef idx="2">
+            <a:schemeClr val="accent1">
+              <a:shade val="50000"/>
+            </a:schemeClr>
+          </a:lnRef>
+          <a:fillRef idx="1">
+            <a:schemeClr val="accent1"/>
+          </a:fillRef>
+          <a:effectRef idx="0">
+            <a:schemeClr val="accent1"/>
+          </a:effectRef>
+          <a:fontRef idx="minor">
+            <a:schemeClr val="lt1"/>
+          </a:fontRef>
+        </p:style>
+        <p:txBody>
+          <a:bodyPr rtlCol="0" anchor="ctr"/>
+          <a:lstStyle/>
+          <a:p>
+            <a:pPr algn="ctr"/>
+            <a:r>
+              <a:rPr lang="en-US" b="1" dirty="0">
+                <a:solidFill>
+                  <a:schemeClr val="tx1"/>
+                </a:solidFill>
+              </a:rPr>
+              <a:t>+</a:t>
+            </a:r>
+          </a:p>
+          <a:p>
+            <a:pPr algn="ctr"/>
+            <a:endParaRPr lang="en-US" b="1" dirty="0">
+              <a:solidFill>
+                <a:schemeClr val="tx1"/>
+              </a:solidFill>
+            </a:endParaRPr>
+          </a:p>
+          <a:p>
+            <a:pPr algn="ctr"/>
+            <a:r>
+              <a:rPr lang="en-US" b="1" dirty="0">
+                <a:solidFill>
+                  <a:schemeClr val="tx1"/>
+                </a:solidFill>
+              </a:rPr>
+              <a:t>+</a:t>
+            </a:r>
+          </a:p>
+          <a:p>
+            <a:pPr algn="ctr"/>
+            <a:endParaRPr lang="en-US" b="1" dirty="0">
+              <a:solidFill>
+                <a:schemeClr val="tx1"/>
+              </a:solidFill>
+            </a:endParaRPr>
+          </a:p>
+          <a:p>
+            <a:pPr algn="ctr"/>
+            <a:r>
+              <a:rPr lang="en-US" b="1" dirty="0">
+                <a:solidFill>
+                  <a:schemeClr val="tx1"/>
+                </a:solidFill>
+              </a:rPr>
+              <a:t>+</a:t>
+            </a:r>
+          </a:p>
+          <a:p>
+            <a:pPr algn="ctr"/>
+            <a:endParaRPr lang="en-US" b="1" dirty="0">
+              <a:solidFill>
+                <a:schemeClr val="tx1"/>
+              </a:solidFill>
+            </a:endParaRPr>
+          </a:p>
+          <a:p>
+            <a:pPr algn="ctr"/>
+            <a:r>
+              <a:rPr lang="en-US" b="1" dirty="0">
+                <a:solidFill>
+                  <a:schemeClr val="tx1"/>
+                </a:solidFill>
+              </a:rPr>
+              <a:t>+</a:t>
+            </a:r>
+          </a:p>
+          <a:p>
+            <a:pPr algn="ctr"/>
+            <a:endParaRPr lang="en-US" b="1" dirty="0">
+              <a:solidFill>
+                <a:schemeClr val="tx1"/>
+              </a:solidFill>
+            </a:endParaRPr>
+          </a:p>
+          <a:p>
+            <a:pPr algn="ctr"/>
+            <a:r>
+              <a:rPr lang="en-US" b="1" dirty="0">
+                <a:solidFill>
+                  <a:schemeClr val="tx1"/>
+                </a:solidFill>
+              </a:rPr>
+              <a:t>+</a:t>
+            </a:r>
+          </a:p>
+          <a:p>
+            <a:pPr algn="ctr"/>
+            <a:endParaRPr lang="en-US" b="1" dirty="0">
+              <a:solidFill>
+                <a:schemeClr val="tx1"/>
+              </a:solidFill>
+            </a:endParaRPr>
+          </a:p>
+          <a:p>
+            <a:pPr algn="ctr"/>
+            <a:r>
+              <a:rPr lang="en-US" b="1" dirty="0">
+                <a:solidFill>
+                  <a:schemeClr val="tx1"/>
+                </a:solidFill>
+              </a:rPr>
+              <a:t>+</a:t>
+            </a:r>
+          </a:p>
+          <a:p>
+            <a:pPr algn="ctr"/>
+            <a:endParaRPr lang="en-US" b="1" dirty="0">
+              <a:solidFill>
+                <a:schemeClr val="tx1"/>
+              </a:solidFill>
+            </a:endParaRPr>
+          </a:p>
+          <a:p>
+            <a:pPr algn="ctr"/>
+            <a:r>
+              <a:rPr lang="en-US" b="1" dirty="0">
+                <a:solidFill>
+                  <a:schemeClr val="tx1"/>
+                </a:solidFill>
+              </a:rPr>
+              <a:t>+</a:t>
+            </a:r>
+          </a:p>
+          <a:p>
+            <a:pPr algn="ctr"/>
+            <a:endParaRPr lang="en-US" b="1" dirty="0">
+              <a:solidFill>
+                <a:schemeClr val="tx1"/>
+              </a:solidFill>
+            </a:endParaRPr>
+          </a:p>
+          <a:p>
+            <a:pPr algn="ctr"/>
+            <a:r>
+              <a:rPr lang="en-US" b="1" dirty="0">
+                <a:solidFill>
+                  <a:schemeClr val="tx1"/>
+                </a:solidFill>
+              </a:rPr>
+              <a:t>+</a:t>
+            </a:r>
+          </a:p>
+          <a:p>
+            <a:pPr algn="ctr"/>
+            <a:endParaRPr lang="en-US" b="1" dirty="0">
+              <a:solidFill>
+                <a:schemeClr val="tx1"/>
+              </a:solidFill>
+            </a:endParaRPr>
+          </a:p>
+          <a:p>
+            <a:pPr algn="ctr"/>
+            <a:r>
+              <a:rPr lang="en-US" b="1" dirty="0">
+                <a:solidFill>
+                  <a:schemeClr val="tx1"/>
+                </a:solidFill>
+              </a:rPr>
+              <a:t>+</a:t>
+            </a:r>
+          </a:p>
+        </p:txBody>
+      </p:sp>
+      <p:sp>
+        <p:nvSpPr>
+          <p:cNvPr id="6" name="Rectangle 5">
+            <a:extLst>
+              <a:ext uri="{FF2B5EF4-FFF2-40B4-BE49-F238E27FC236}">
+                <a16:creationId xmlns:a16="http://schemas.microsoft.com/office/drawing/2014/main" id="{44C1551D-3FFA-C6E2-95C2-CCAE72D7B592}"/>
+              </a:ext>
+            </a:extLst>
+          </p:cNvPr>
+          <p:cNvSpPr/>
+          <p:nvPr/>
+        </p:nvSpPr>
+        <p:spPr>
+          <a:xfrm>
+            <a:off x="8311378" y="769434"/>
+            <a:ext cx="535258" cy="5062654"/>
+          </a:xfrm>
+          <a:prstGeom prst="rect">
+            <a:avLst/>
+          </a:prstGeom>
+          <a:noFill/>
+          <a:ln w="28575">
+            <a:solidFill>
+              <a:schemeClr val="tx1"/>
+            </a:solidFill>
+          </a:ln>
+        </p:spPr>
+        <p:style>
+          <a:lnRef idx="2">
+            <a:schemeClr val="accent1">
+              <a:shade val="50000"/>
+            </a:schemeClr>
+          </a:lnRef>
+          <a:fillRef idx="1">
+            <a:schemeClr val="accent1"/>
+          </a:fillRef>
+          <a:effectRef idx="0">
+            <a:schemeClr val="accent1"/>
+          </a:effectRef>
+          <a:fontRef idx="minor">
+            <a:schemeClr val="lt1"/>
+          </a:fontRef>
+        </p:style>
+        <p:txBody>
+          <a:bodyPr rtlCol="0" anchor="ctr"/>
+          <a:lstStyle/>
+          <a:p>
+            <a:pPr algn="ctr"/>
+            <a:r>
+              <a:rPr lang="en-US" b="1" dirty="0">
+                <a:solidFill>
+                  <a:schemeClr val="tx1"/>
+                </a:solidFill>
+              </a:rPr>
+              <a:t>-</a:t>
+            </a:r>
+          </a:p>
+          <a:p>
+            <a:pPr algn="ctr"/>
+            <a:endParaRPr lang="en-US" b="1" dirty="0">
+              <a:solidFill>
+                <a:schemeClr val="tx1"/>
+              </a:solidFill>
+            </a:endParaRPr>
+          </a:p>
+          <a:p>
+            <a:pPr algn="ctr"/>
+            <a:r>
+              <a:rPr lang="en-US" b="1" dirty="0">
+                <a:solidFill>
+                  <a:schemeClr val="tx1"/>
+                </a:solidFill>
+              </a:rPr>
+              <a:t>-</a:t>
+            </a:r>
+          </a:p>
+          <a:p>
+            <a:pPr algn="ctr"/>
+            <a:endParaRPr lang="en-US" b="1" dirty="0">
+              <a:solidFill>
+                <a:schemeClr val="tx1"/>
+              </a:solidFill>
+            </a:endParaRPr>
+          </a:p>
+          <a:p>
+            <a:pPr algn="ctr"/>
+            <a:r>
+              <a:rPr lang="en-US" b="1" dirty="0">
+                <a:solidFill>
+                  <a:schemeClr val="tx1"/>
+                </a:solidFill>
+              </a:rPr>
+              <a:t>-</a:t>
+            </a:r>
+          </a:p>
+          <a:p>
+            <a:pPr algn="ctr"/>
+            <a:endParaRPr lang="en-US" b="1" dirty="0">
+              <a:solidFill>
+                <a:schemeClr val="tx1"/>
+              </a:solidFill>
+            </a:endParaRPr>
+          </a:p>
+          <a:p>
+            <a:pPr algn="ctr"/>
+            <a:r>
+              <a:rPr lang="en-US" b="1" dirty="0">
+                <a:solidFill>
+                  <a:schemeClr val="tx1"/>
+                </a:solidFill>
+              </a:rPr>
+              <a:t>-</a:t>
+            </a:r>
+          </a:p>
+          <a:p>
+            <a:pPr algn="ctr"/>
+            <a:endParaRPr lang="en-US" b="1" dirty="0">
+              <a:solidFill>
+                <a:schemeClr val="tx1"/>
+              </a:solidFill>
+            </a:endParaRPr>
+          </a:p>
+          <a:p>
+            <a:pPr algn="ctr"/>
+            <a:r>
+              <a:rPr lang="en-US" b="1" dirty="0">
+                <a:solidFill>
+                  <a:schemeClr val="tx1"/>
+                </a:solidFill>
+              </a:rPr>
+              <a:t>-</a:t>
+            </a:r>
+          </a:p>
+          <a:p>
+            <a:pPr algn="ctr"/>
+            <a:endParaRPr lang="en-US" b="1" dirty="0">
+              <a:solidFill>
+                <a:schemeClr val="tx1"/>
+              </a:solidFill>
+            </a:endParaRPr>
+          </a:p>
+          <a:p>
+            <a:pPr algn="ctr"/>
+            <a:r>
+              <a:rPr lang="en-US" b="1" dirty="0">
+                <a:solidFill>
+                  <a:schemeClr val="tx1"/>
+                </a:solidFill>
+              </a:rPr>
+              <a:t>-</a:t>
+            </a:r>
+          </a:p>
+          <a:p>
+            <a:pPr algn="ctr"/>
+            <a:endParaRPr lang="en-US" b="1" dirty="0">
+              <a:solidFill>
+                <a:schemeClr val="tx1"/>
+              </a:solidFill>
+            </a:endParaRPr>
+          </a:p>
+          <a:p>
+            <a:pPr algn="ctr"/>
+            <a:r>
+              <a:rPr lang="en-US" b="1" dirty="0">
+                <a:solidFill>
+                  <a:schemeClr val="tx1"/>
+                </a:solidFill>
+              </a:rPr>
+              <a:t>-</a:t>
+            </a:r>
+          </a:p>
+          <a:p>
+            <a:pPr algn="ctr"/>
+            <a:endParaRPr lang="en-US" b="1" dirty="0">
+              <a:solidFill>
+                <a:schemeClr val="tx1"/>
+              </a:solidFill>
+            </a:endParaRPr>
+          </a:p>
+          <a:p>
+            <a:pPr algn="ctr"/>
+            <a:r>
+              <a:rPr lang="en-US" b="1" dirty="0">
+                <a:solidFill>
+                  <a:schemeClr val="tx1"/>
+                </a:solidFill>
+              </a:rPr>
+              <a:t>-</a:t>
+            </a:r>
+          </a:p>
+          <a:p>
+            <a:pPr algn="ctr"/>
+            <a:endParaRPr lang="en-US" b="1" dirty="0">
+              <a:solidFill>
+                <a:schemeClr val="tx1"/>
+              </a:solidFill>
+            </a:endParaRPr>
+          </a:p>
+          <a:p>
+            <a:pPr algn="ctr"/>
+            <a:r>
+              <a:rPr lang="en-US" b="1" dirty="0">
+                <a:solidFill>
+                  <a:schemeClr val="tx1"/>
+                </a:solidFill>
+              </a:rPr>
+              <a:t>-</a:t>
+            </a:r>
+          </a:p>
+        </p:txBody>
+      </p:sp>
+      <p:cxnSp>
+        <p:nvCxnSpPr>
+          <p:cNvPr id="8" name="Straight Arrow Connector 7">
+            <a:extLst>
+              <a:ext uri="{FF2B5EF4-FFF2-40B4-BE49-F238E27FC236}">
+                <a16:creationId xmlns:a16="http://schemas.microsoft.com/office/drawing/2014/main" id="{5E402E11-F4F5-DCDA-9F58-1C392ADF8755}"/>
+              </a:ext>
+            </a:extLst>
+          </p:cNvPr>
+          <p:cNvCxnSpPr/>
+          <p:nvPr/>
+        </p:nvCxnSpPr>
+        <p:spPr>
+          <a:xfrm>
+            <a:off x="3880624" y="1146629"/>
+            <a:ext cx="4430754" cy="0"/>
+          </a:xfrm>
+          <a:prstGeom prst="straightConnector1">
+            <a:avLst/>
+          </a:prstGeom>
+          <a:ln w="38100">
+            <a:solidFill>
+              <a:schemeClr val="tx1"/>
+            </a:solidFill>
+            <a:tailEnd type="triangle" w="lg" len="med"/>
+          </a:ln>
+        </p:spPr>
+        <p:style>
+          <a:lnRef idx="1">
+            <a:schemeClr val="accent1"/>
+          </a:lnRef>
+          <a:fillRef idx="0">
+            <a:schemeClr val="accent1"/>
+          </a:fillRef>
+          <a:effectRef idx="0">
+            <a:schemeClr val="accent1"/>
+          </a:effectRef>
+          <a:fontRef idx="minor">
+            <a:schemeClr val="tx1"/>
+          </a:fontRef>
+        </p:style>
+      </p:cxnSp>
+      <p:cxnSp>
+        <p:nvCxnSpPr>
+          <p:cNvPr id="9" name="Straight Arrow Connector 8">
+            <a:extLst>
+              <a:ext uri="{FF2B5EF4-FFF2-40B4-BE49-F238E27FC236}">
+                <a16:creationId xmlns:a16="http://schemas.microsoft.com/office/drawing/2014/main" id="{08C24119-D793-8C79-1E7B-3053546BBA12}"/>
+              </a:ext>
+            </a:extLst>
+          </p:cNvPr>
+          <p:cNvCxnSpPr/>
+          <p:nvPr/>
+        </p:nvCxnSpPr>
+        <p:spPr>
+          <a:xfrm>
+            <a:off x="3880624" y="2213429"/>
+            <a:ext cx="4430754" cy="0"/>
+          </a:xfrm>
+          <a:prstGeom prst="straightConnector1">
+            <a:avLst/>
+          </a:prstGeom>
+          <a:ln w="38100">
+            <a:solidFill>
+              <a:schemeClr val="tx1"/>
+            </a:solidFill>
+            <a:tailEnd type="triangle" w="lg" len="med"/>
+          </a:ln>
+        </p:spPr>
+        <p:style>
+          <a:lnRef idx="1">
+            <a:schemeClr val="accent1"/>
+          </a:lnRef>
+          <a:fillRef idx="0">
+            <a:schemeClr val="accent1"/>
+          </a:fillRef>
+          <a:effectRef idx="0">
+            <a:schemeClr val="accent1"/>
+          </a:effectRef>
+          <a:fontRef idx="minor">
+            <a:schemeClr val="tx1"/>
+          </a:fontRef>
+        </p:style>
+      </p:cxnSp>
+      <p:cxnSp>
+        <p:nvCxnSpPr>
+          <p:cNvPr id="10" name="Straight Arrow Connector 9">
+            <a:extLst>
+              <a:ext uri="{FF2B5EF4-FFF2-40B4-BE49-F238E27FC236}">
+                <a16:creationId xmlns:a16="http://schemas.microsoft.com/office/drawing/2014/main" id="{5DA22740-F9E0-DB08-890E-7ABC63C00036}"/>
+              </a:ext>
+            </a:extLst>
+          </p:cNvPr>
+          <p:cNvCxnSpPr/>
+          <p:nvPr/>
+        </p:nvCxnSpPr>
+        <p:spPr>
+          <a:xfrm>
+            <a:off x="3880624" y="3300761"/>
+            <a:ext cx="4430754" cy="0"/>
+          </a:xfrm>
+          <a:prstGeom prst="straightConnector1">
+            <a:avLst/>
+          </a:prstGeom>
+          <a:ln w="38100">
+            <a:solidFill>
+              <a:schemeClr val="tx1"/>
+            </a:solidFill>
+            <a:tailEnd type="triangle" w="lg" len="med"/>
+          </a:ln>
+        </p:spPr>
+        <p:style>
+          <a:lnRef idx="1">
+            <a:schemeClr val="accent1"/>
+          </a:lnRef>
+          <a:fillRef idx="0">
+            <a:schemeClr val="accent1"/>
+          </a:fillRef>
+          <a:effectRef idx="0">
+            <a:schemeClr val="accent1"/>
+          </a:effectRef>
+          <a:fontRef idx="minor">
+            <a:schemeClr val="tx1"/>
+          </a:fontRef>
+        </p:style>
+      </p:cxnSp>
+      <p:cxnSp>
+        <p:nvCxnSpPr>
+          <p:cNvPr id="11" name="Straight Arrow Connector 10">
+            <a:extLst>
+              <a:ext uri="{FF2B5EF4-FFF2-40B4-BE49-F238E27FC236}">
+                <a16:creationId xmlns:a16="http://schemas.microsoft.com/office/drawing/2014/main" id="{3B500D77-E36E-F996-8C6B-99674718EDF4}"/>
+              </a:ext>
+            </a:extLst>
+          </p:cNvPr>
+          <p:cNvCxnSpPr/>
+          <p:nvPr/>
+        </p:nvCxnSpPr>
+        <p:spPr>
+          <a:xfrm>
+            <a:off x="3880623" y="4411104"/>
+            <a:ext cx="4430754" cy="0"/>
+          </a:xfrm>
+          <a:prstGeom prst="straightConnector1">
+            <a:avLst/>
+          </a:prstGeom>
+          <a:ln w="38100">
+            <a:solidFill>
+              <a:schemeClr val="tx1"/>
+            </a:solidFill>
+            <a:tailEnd type="triangle" w="lg" len="med"/>
+          </a:ln>
+        </p:spPr>
+        <p:style>
+          <a:lnRef idx="1">
+            <a:schemeClr val="accent1"/>
+          </a:lnRef>
+          <a:fillRef idx="0">
+            <a:schemeClr val="accent1"/>
+          </a:fillRef>
+          <a:effectRef idx="0">
+            <a:schemeClr val="accent1"/>
+          </a:effectRef>
+          <a:fontRef idx="minor">
+            <a:schemeClr val="tx1"/>
+          </a:fontRef>
+        </p:style>
+      </p:cxnSp>
+      <p:cxnSp>
+        <p:nvCxnSpPr>
+          <p:cNvPr id="12" name="Straight Arrow Connector 11">
+            <a:extLst>
+              <a:ext uri="{FF2B5EF4-FFF2-40B4-BE49-F238E27FC236}">
+                <a16:creationId xmlns:a16="http://schemas.microsoft.com/office/drawing/2014/main" id="{B48D63D1-3E22-6F26-C4C5-8C06F5EEBCAF}"/>
+              </a:ext>
+            </a:extLst>
+          </p:cNvPr>
+          <p:cNvCxnSpPr/>
+          <p:nvPr/>
+        </p:nvCxnSpPr>
+        <p:spPr>
+          <a:xfrm>
+            <a:off x="3880623" y="5506932"/>
+            <a:ext cx="4430754" cy="0"/>
+          </a:xfrm>
+          <a:prstGeom prst="straightConnector1">
+            <a:avLst/>
+          </a:prstGeom>
+          <a:ln w="38100">
+            <a:solidFill>
+              <a:schemeClr val="tx1"/>
+            </a:solidFill>
+            <a:tailEnd type="triangle" w="lg" len="med"/>
+          </a:ln>
+        </p:spPr>
+        <p:style>
+          <a:lnRef idx="1">
+            <a:schemeClr val="accent1"/>
+          </a:lnRef>
+          <a:fillRef idx="0">
+            <a:schemeClr val="accent1"/>
+          </a:fillRef>
+          <a:effectRef idx="0">
+            <a:schemeClr val="accent1"/>
+          </a:effectRef>
+          <a:fontRef idx="minor">
+            <a:schemeClr val="tx1"/>
+          </a:fontRef>
+        </p:style>
+      </p:cxnSp>
+      <p:sp>
+        <p:nvSpPr>
+          <p:cNvPr id="13" name="Oval 12">
+            <a:extLst>
+              <a:ext uri="{FF2B5EF4-FFF2-40B4-BE49-F238E27FC236}">
+                <a16:creationId xmlns:a16="http://schemas.microsoft.com/office/drawing/2014/main" id="{7926E4D5-5AAD-A876-31A6-594C20FD888F}"/>
+              </a:ext>
+            </a:extLst>
+          </p:cNvPr>
+          <p:cNvSpPr/>
+          <p:nvPr/>
+        </p:nvSpPr>
+        <p:spPr>
+          <a:xfrm>
+            <a:off x="4426857" y="2362149"/>
+            <a:ext cx="522515" cy="522515"/>
+          </a:xfrm>
+          <a:prstGeom prst="ellipse">
+            <a:avLst/>
+          </a:prstGeom>
+          <a:solidFill>
+            <a:srgbClr val="FF0000"/>
+          </a:solidFill>
+          <a:ln>
+            <a:noFill/>
+          </a:ln>
+        </p:spPr>
+        <p:style>
+          <a:lnRef idx="2">
+            <a:schemeClr val="accent1">
+              <a:shade val="50000"/>
+            </a:schemeClr>
+          </a:lnRef>
+          <a:fillRef idx="1">
+            <a:schemeClr val="accent1"/>
+          </a:fillRef>
+          <a:effectRef idx="0">
+            <a:schemeClr val="accent1"/>
+          </a:effectRef>
+          <a:fontRef idx="minor">
+            <a:schemeClr val="lt1"/>
+          </a:fontRef>
+        </p:style>
+        <p:txBody>
+          <a:bodyPr rtlCol="0" anchor="ctr"/>
+          <a:lstStyle/>
+          <a:p>
+            <a:pPr algn="ctr"/>
+            <a:r>
+              <a:rPr lang="en-US" sz="3600" b="1" dirty="0"/>
+              <a:t>+</a:t>
+            </a:r>
+          </a:p>
+        </p:txBody>
+      </p:sp>
+      <p:sp>
+        <p:nvSpPr>
+          <p:cNvPr id="14" name="Oval 13">
+            <a:extLst>
+              <a:ext uri="{FF2B5EF4-FFF2-40B4-BE49-F238E27FC236}">
+                <a16:creationId xmlns:a16="http://schemas.microsoft.com/office/drawing/2014/main" id="{9A3DB881-511F-C368-41BE-052BB6121857}"/>
+              </a:ext>
+            </a:extLst>
+          </p:cNvPr>
+          <p:cNvSpPr/>
+          <p:nvPr/>
+        </p:nvSpPr>
+        <p:spPr>
+          <a:xfrm>
+            <a:off x="6686573" y="3514489"/>
+            <a:ext cx="522515" cy="522515"/>
+          </a:xfrm>
+          <a:prstGeom prst="ellipse">
+            <a:avLst/>
+          </a:prstGeom>
+          <a:solidFill>
+            <a:srgbClr val="FF0000"/>
+          </a:solidFill>
+          <a:ln>
+            <a:noFill/>
+          </a:ln>
+        </p:spPr>
+        <p:style>
+          <a:lnRef idx="2">
+            <a:schemeClr val="accent1">
+              <a:shade val="50000"/>
+            </a:schemeClr>
+          </a:lnRef>
+          <a:fillRef idx="1">
+            <a:schemeClr val="accent1"/>
+          </a:fillRef>
+          <a:effectRef idx="0">
+            <a:schemeClr val="accent1"/>
+          </a:effectRef>
+          <a:fontRef idx="minor">
+            <a:schemeClr val="lt1"/>
+          </a:fontRef>
+        </p:style>
+        <p:txBody>
+          <a:bodyPr rtlCol="0" anchor="ctr"/>
+          <a:lstStyle/>
+          <a:p>
+            <a:pPr algn="ctr"/>
+            <a:r>
+              <a:rPr lang="en-US" sz="3600" b="1" dirty="0"/>
+              <a:t>+</a:t>
+            </a:r>
+          </a:p>
+        </p:txBody>
+      </p:sp>
+      <p:sp>
+        <p:nvSpPr>
+          <p:cNvPr id="15" name="TextBox 14">
+            <a:extLst>
+              <a:ext uri="{FF2B5EF4-FFF2-40B4-BE49-F238E27FC236}">
+                <a16:creationId xmlns:a16="http://schemas.microsoft.com/office/drawing/2014/main" id="{908204DB-B15E-EF1C-6FCA-51FFE51E9718}"/>
+              </a:ext>
+            </a:extLst>
+          </p:cNvPr>
+          <p:cNvSpPr txBox="1"/>
+          <p:nvPr/>
+        </p:nvSpPr>
+        <p:spPr>
+          <a:xfrm>
+            <a:off x="4018113" y="2901521"/>
+            <a:ext cx="2178866" cy="369332"/>
+          </a:xfrm>
+          <a:prstGeom prst="rect">
+            <a:avLst/>
+          </a:prstGeom>
+          <a:noFill/>
+        </p:spPr>
+        <p:txBody>
+          <a:bodyPr wrap="none" rtlCol="0">
+            <a:spAutoFit/>
+          </a:bodyPr>
+          <a:lstStyle/>
+          <a:p>
+            <a:r>
+              <a:rPr lang="en-US" i="1" dirty="0"/>
+              <a:t>high potential energy</a:t>
+            </a:r>
+          </a:p>
+        </p:txBody>
+      </p:sp>
+      <p:sp>
+        <p:nvSpPr>
+          <p:cNvPr id="16" name="TextBox 15">
+            <a:extLst>
+              <a:ext uri="{FF2B5EF4-FFF2-40B4-BE49-F238E27FC236}">
+                <a16:creationId xmlns:a16="http://schemas.microsoft.com/office/drawing/2014/main" id="{40E5C4CD-8EAE-1251-E9BA-DF9C40032835}"/>
+              </a:ext>
+            </a:extLst>
+          </p:cNvPr>
+          <p:cNvSpPr txBox="1"/>
+          <p:nvPr/>
+        </p:nvSpPr>
+        <p:spPr>
+          <a:xfrm>
+            <a:off x="6081477" y="4021912"/>
+            <a:ext cx="2150460" cy="369332"/>
+          </a:xfrm>
+          <a:prstGeom prst="rect">
+            <a:avLst/>
+          </a:prstGeom>
+          <a:noFill/>
+        </p:spPr>
+        <p:txBody>
+          <a:bodyPr wrap="none" rtlCol="0">
+            <a:spAutoFit/>
+          </a:bodyPr>
+          <a:lstStyle/>
+          <a:p>
+            <a:r>
+              <a:rPr lang="en-US" i="1" dirty="0"/>
+              <a:t>low potential energy</a:t>
+            </a:r>
+          </a:p>
+        </p:txBody>
+      </p:sp>
+      <p:grpSp>
+        <p:nvGrpSpPr>
+          <p:cNvPr id="20" name="Group 19">
+            <a:extLst>
+              <a:ext uri="{FF2B5EF4-FFF2-40B4-BE49-F238E27FC236}">
+                <a16:creationId xmlns:a16="http://schemas.microsoft.com/office/drawing/2014/main" id="{476721E9-2EFA-3CED-BD3A-4C59C1B4DAE4}"/>
+              </a:ext>
+            </a:extLst>
+          </p:cNvPr>
+          <p:cNvGrpSpPr/>
+          <p:nvPr/>
+        </p:nvGrpSpPr>
+        <p:grpSpPr>
+          <a:xfrm>
+            <a:off x="4949372" y="2438740"/>
+            <a:ext cx="769435" cy="369332"/>
+            <a:chOff x="4949372" y="2438740"/>
+            <a:chExt cx="769435" cy="369332"/>
+          </a:xfrm>
+        </p:grpSpPr>
+        <p:cxnSp>
+          <p:nvCxnSpPr>
+            <p:cNvPr id="18" name="Straight Arrow Connector 17">
+              <a:extLst>
+                <a:ext uri="{FF2B5EF4-FFF2-40B4-BE49-F238E27FC236}">
+                  <a16:creationId xmlns:a16="http://schemas.microsoft.com/office/drawing/2014/main" id="{1BB35EF2-B054-D7D2-C794-F535EF69C19A}"/>
+                </a:ext>
+              </a:extLst>
+            </p:cNvPr>
+            <p:cNvCxnSpPr>
+              <a:stCxn id="13" idx="6"/>
+            </p:cNvCxnSpPr>
+            <p:nvPr/>
+          </p:nvCxnSpPr>
+          <p:spPr>
+            <a:xfrm flipV="1">
+              <a:off x="4949372" y="2623406"/>
+              <a:ext cx="478971" cy="1"/>
+            </a:xfrm>
+            <a:prstGeom prst="straightConnector1">
+              <a:avLst/>
+            </a:prstGeom>
+            <a:ln w="31750">
+              <a:solidFill>
+                <a:schemeClr val="tx1"/>
+              </a:solidFill>
+              <a:tailEnd type="triangle" w="lg" len="lg"/>
+            </a:ln>
+          </p:spPr>
+          <p:style>
+            <a:lnRef idx="1">
+              <a:schemeClr val="accent1"/>
+            </a:lnRef>
+            <a:fillRef idx="0">
+              <a:schemeClr val="accent1"/>
+            </a:fillRef>
+            <a:effectRef idx="0">
+              <a:schemeClr val="accent1"/>
+            </a:effectRef>
+            <a:fontRef idx="minor">
+              <a:schemeClr val="tx1"/>
+            </a:fontRef>
+          </p:style>
+        </p:cxnSp>
+        <p:sp>
+          <p:nvSpPr>
+            <p:cNvPr id="19" name="TextBox 18">
+              <a:extLst>
+                <a:ext uri="{FF2B5EF4-FFF2-40B4-BE49-F238E27FC236}">
+                  <a16:creationId xmlns:a16="http://schemas.microsoft.com/office/drawing/2014/main" id="{E6FEC8FE-B10B-1768-4A27-4373D56AD29E}"/>
+                </a:ext>
+              </a:extLst>
+            </p:cNvPr>
+            <p:cNvSpPr txBox="1"/>
+            <p:nvPr/>
+          </p:nvSpPr>
+          <p:spPr>
+            <a:xfrm>
+              <a:off x="5428343" y="2438740"/>
+              <a:ext cx="290464" cy="369332"/>
+            </a:xfrm>
+            <a:prstGeom prst="rect">
+              <a:avLst/>
+            </a:prstGeom>
+            <a:noFill/>
+          </p:spPr>
+          <p:txBody>
+            <a:bodyPr wrap="none" rtlCol="0">
+              <a:spAutoFit/>
+            </a:bodyPr>
+            <a:lstStyle/>
+            <a:p>
+              <a:r>
+                <a:rPr lang="en-US" b="1" dirty="0"/>
+                <a:t>F</a:t>
+              </a:r>
+            </a:p>
+          </p:txBody>
+        </p:sp>
+      </p:grpSp>
+      <p:grpSp>
+        <p:nvGrpSpPr>
+          <p:cNvPr id="21" name="Group 20">
+            <a:extLst>
+              <a:ext uri="{FF2B5EF4-FFF2-40B4-BE49-F238E27FC236}">
+                <a16:creationId xmlns:a16="http://schemas.microsoft.com/office/drawing/2014/main" id="{27EA5775-1D76-C578-E14D-61570E3F01EA}"/>
+              </a:ext>
+            </a:extLst>
+          </p:cNvPr>
+          <p:cNvGrpSpPr/>
+          <p:nvPr/>
+        </p:nvGrpSpPr>
+        <p:grpSpPr>
+          <a:xfrm>
+            <a:off x="7209088" y="3578702"/>
+            <a:ext cx="769435" cy="369332"/>
+            <a:chOff x="4949372" y="2438740"/>
+            <a:chExt cx="769435" cy="369332"/>
+          </a:xfrm>
+        </p:grpSpPr>
+        <p:cxnSp>
+          <p:nvCxnSpPr>
+            <p:cNvPr id="22" name="Straight Arrow Connector 21">
+              <a:extLst>
+                <a:ext uri="{FF2B5EF4-FFF2-40B4-BE49-F238E27FC236}">
+                  <a16:creationId xmlns:a16="http://schemas.microsoft.com/office/drawing/2014/main" id="{F636E77D-E5BB-9233-8150-CD9688CD1A34}"/>
+                </a:ext>
+              </a:extLst>
+            </p:cNvPr>
+            <p:cNvCxnSpPr/>
+            <p:nvPr/>
+          </p:nvCxnSpPr>
+          <p:spPr>
+            <a:xfrm flipV="1">
+              <a:off x="4949372" y="2623406"/>
+              <a:ext cx="478971" cy="1"/>
+            </a:xfrm>
+            <a:prstGeom prst="straightConnector1">
+              <a:avLst/>
+            </a:prstGeom>
+            <a:ln w="31750">
+              <a:solidFill>
+                <a:schemeClr val="tx1"/>
+              </a:solidFill>
+              <a:tailEnd type="triangle" w="lg" len="lg"/>
+            </a:ln>
+          </p:spPr>
+          <p:style>
+            <a:lnRef idx="1">
+              <a:schemeClr val="accent1"/>
+            </a:lnRef>
+            <a:fillRef idx="0">
+              <a:schemeClr val="accent1"/>
+            </a:fillRef>
+            <a:effectRef idx="0">
+              <a:schemeClr val="accent1"/>
+            </a:effectRef>
+            <a:fontRef idx="minor">
+              <a:schemeClr val="tx1"/>
+            </a:fontRef>
+          </p:style>
+        </p:cxnSp>
+        <p:sp>
+          <p:nvSpPr>
+            <p:cNvPr id="23" name="TextBox 22">
+              <a:extLst>
+                <a:ext uri="{FF2B5EF4-FFF2-40B4-BE49-F238E27FC236}">
+                  <a16:creationId xmlns:a16="http://schemas.microsoft.com/office/drawing/2014/main" id="{40B0A477-798E-B995-B641-0CDF89055908}"/>
+                </a:ext>
+              </a:extLst>
+            </p:cNvPr>
+            <p:cNvSpPr txBox="1"/>
+            <p:nvPr/>
+          </p:nvSpPr>
+          <p:spPr>
+            <a:xfrm>
+              <a:off x="5428343" y="2438740"/>
+              <a:ext cx="290464" cy="369332"/>
+            </a:xfrm>
+            <a:prstGeom prst="rect">
+              <a:avLst/>
+            </a:prstGeom>
+            <a:noFill/>
+          </p:spPr>
+          <p:txBody>
+            <a:bodyPr wrap="none" rtlCol="0">
+              <a:spAutoFit/>
+            </a:bodyPr>
+            <a:lstStyle/>
+            <a:p>
+              <a:r>
+                <a:rPr lang="en-US" b="1" dirty="0"/>
+                <a:t>F</a:t>
+              </a:r>
+            </a:p>
+          </p:txBody>
+        </p:sp>
+      </p:grpSp>
+    </p:spTree>
+    <p:extLst>
+      <p:ext uri="{BB962C8B-B14F-4D97-AF65-F5344CB8AC3E}">
+        <p14:creationId xmlns:p14="http://schemas.microsoft.com/office/powerpoint/2010/main" val="3294832735"/>
       </p:ext>
     </p:extLst>
   </p:cSld>

</xml_diff>

<commit_message>
AS91173: Minor fixes and improvements
</commit_message>
<xml_diff>
--- a/content/12phy/as91173/Circuits.pptx
+++ b/content/12phy/as91173/Circuits.pptx
@@ -5,13 +5,14 @@
     <p:sldMasterId id="2147483648" r:id="rId1"/>
   </p:sldMasterIdLst>
   <p:notesMasterIdLst>
-    <p:notesMasterId r:id="rId6"/>
+    <p:notesMasterId r:id="rId7"/>
   </p:notesMasterIdLst>
   <p:sldIdLst>
     <p:sldId id="257" r:id="rId2"/>
     <p:sldId id="258" r:id="rId3"/>
     <p:sldId id="259" r:id="rId4"/>
-    <p:sldId id="260" r:id="rId5"/>
+    <p:sldId id="261" r:id="rId5"/>
+    <p:sldId id="260" r:id="rId6"/>
   </p:sldIdLst>
   <p:sldSz cx="12192000" cy="6858000"/>
   <p:notesSz cx="6858000" cy="9144000"/>
@@ -200,7 +201,7 @@
           <a:p>
             <a:fld id="{B7A466D3-1E6A-AF46-AFD8-4B8FB1690381}" type="datetimeFigureOut">
               <a:rPr lang="en-US" smtClean="0"/>
-              <a:t>5/10/23</a:t>
+              <a:t>5/18/23</a:t>
             </a:fld>
             <a:endParaRPr lang="en-US"/>
           </a:p>
@@ -720,6 +721,90 @@
 </p:notes>
 </file>
 
+<file path=ppt/notesSlides/notesSlide4.xml><?xml version="1.0" encoding="utf-8"?>
+<p:notes xmlns:a="http://schemas.openxmlformats.org/drawingml/2006/main" xmlns:r="http://schemas.openxmlformats.org/officeDocument/2006/relationships" xmlns:p="http://schemas.openxmlformats.org/presentationml/2006/main">
+  <p:cSld>
+    <p:spTree>
+      <p:nvGrpSpPr>
+        <p:cNvPr id="1" name=""/>
+        <p:cNvGrpSpPr/>
+        <p:nvPr/>
+      </p:nvGrpSpPr>
+      <p:grpSpPr>
+        <a:xfrm>
+          <a:off x="0" y="0"/>
+          <a:ext cx="0" cy="0"/>
+          <a:chOff x="0" y="0"/>
+          <a:chExt cx="0" cy="0"/>
+        </a:xfrm>
+      </p:grpSpPr>
+      <p:sp>
+        <p:nvSpPr>
+          <p:cNvPr id="2" name="Slide Image Placeholder 1"/>
+          <p:cNvSpPr>
+            <a:spLocks noGrp="1" noRot="1" noChangeAspect="1"/>
+          </p:cNvSpPr>
+          <p:nvPr>
+            <p:ph type="sldImg"/>
+          </p:nvPr>
+        </p:nvSpPr>
+        <p:spPr/>
+      </p:sp>
+      <p:sp>
+        <p:nvSpPr>
+          <p:cNvPr id="3" name="Notes Placeholder 2"/>
+          <p:cNvSpPr>
+            <a:spLocks noGrp="1"/>
+          </p:cNvSpPr>
+          <p:nvPr>
+            <p:ph type="body" idx="1"/>
+          </p:nvPr>
+        </p:nvSpPr>
+        <p:spPr/>
+        <p:txBody>
+          <a:bodyPr/>
+          <a:lstStyle/>
+          <a:p>
+            <a:endParaRPr lang="en-US" dirty="0"/>
+          </a:p>
+        </p:txBody>
+      </p:sp>
+      <p:sp>
+        <p:nvSpPr>
+          <p:cNvPr id="4" name="Slide Number Placeholder 3"/>
+          <p:cNvSpPr>
+            <a:spLocks noGrp="1"/>
+          </p:cNvSpPr>
+          <p:nvPr>
+            <p:ph type="sldNum" sz="quarter" idx="5"/>
+          </p:nvPr>
+        </p:nvSpPr>
+        <p:spPr/>
+        <p:txBody>
+          <a:bodyPr/>
+          <a:lstStyle/>
+          <a:p>
+            <a:fld id="{65019192-F81D-A749-B8BB-ACC460F0B253}" type="slidenum">
+              <a:rPr lang="en-US" smtClean="0"/>
+              <a:t>4</a:t>
+            </a:fld>
+            <a:endParaRPr lang="en-US"/>
+          </a:p>
+        </p:txBody>
+      </p:sp>
+    </p:spTree>
+    <p:extLst>
+      <p:ext uri="{BB962C8B-B14F-4D97-AF65-F5344CB8AC3E}">
+        <p14:creationId xmlns:p14="http://schemas.microsoft.com/office/powerpoint/2010/main" val="2030486966"/>
+      </p:ext>
+    </p:extLst>
+  </p:cSld>
+  <p:clrMapOvr>
+    <a:masterClrMapping/>
+  </p:clrMapOvr>
+</p:notes>
+</file>
+
 <file path=ppt/slideLayouts/slideLayout1.xml><?xml version="1.0" encoding="utf-8"?>
 <p:sldLayout xmlns:a="http://schemas.openxmlformats.org/drawingml/2006/main" xmlns:r="http://schemas.openxmlformats.org/officeDocument/2006/relationships" xmlns:p="http://schemas.openxmlformats.org/presentationml/2006/main" type="title" preserve="1">
   <p:cSld name="Title Slide">
@@ -869,7 +954,7 @@
           <a:p>
             <a:fld id="{67261FD3-3482-D84B-9B44-CD816D3AD191}" type="datetimeFigureOut">
               <a:rPr lang="en-US" smtClean="0"/>
-              <a:t>5/10/23</a:t>
+              <a:t>5/18/23</a:t>
             </a:fld>
             <a:endParaRPr lang="en-US"/>
           </a:p>
@@ -1069,7 +1154,7 @@
           <a:p>
             <a:fld id="{67261FD3-3482-D84B-9B44-CD816D3AD191}" type="datetimeFigureOut">
               <a:rPr lang="en-US" smtClean="0"/>
-              <a:t>5/10/23</a:t>
+              <a:t>5/18/23</a:t>
             </a:fld>
             <a:endParaRPr lang="en-US"/>
           </a:p>
@@ -1279,7 +1364,7 @@
           <a:p>
             <a:fld id="{67261FD3-3482-D84B-9B44-CD816D3AD191}" type="datetimeFigureOut">
               <a:rPr lang="en-US" smtClean="0"/>
-              <a:t>5/10/23</a:t>
+              <a:t>5/18/23</a:t>
             </a:fld>
             <a:endParaRPr lang="en-US"/>
           </a:p>
@@ -1479,7 +1564,7 @@
           <a:p>
             <a:fld id="{67261FD3-3482-D84B-9B44-CD816D3AD191}" type="datetimeFigureOut">
               <a:rPr lang="en-US" smtClean="0"/>
-              <a:t>5/10/23</a:t>
+              <a:t>5/18/23</a:t>
             </a:fld>
             <a:endParaRPr lang="en-US"/>
           </a:p>
@@ -1755,7 +1840,7 @@
           <a:p>
             <a:fld id="{67261FD3-3482-D84B-9B44-CD816D3AD191}" type="datetimeFigureOut">
               <a:rPr lang="en-US" smtClean="0"/>
-              <a:t>5/10/23</a:t>
+              <a:t>5/18/23</a:t>
             </a:fld>
             <a:endParaRPr lang="en-US"/>
           </a:p>
@@ -2023,7 +2108,7 @@
           <a:p>
             <a:fld id="{67261FD3-3482-D84B-9B44-CD816D3AD191}" type="datetimeFigureOut">
               <a:rPr lang="en-US" smtClean="0"/>
-              <a:t>5/10/23</a:t>
+              <a:t>5/18/23</a:t>
             </a:fld>
             <a:endParaRPr lang="en-US"/>
           </a:p>
@@ -2438,7 +2523,7 @@
           <a:p>
             <a:fld id="{67261FD3-3482-D84B-9B44-CD816D3AD191}" type="datetimeFigureOut">
               <a:rPr lang="en-US" smtClean="0"/>
-              <a:t>5/10/23</a:t>
+              <a:t>5/18/23</a:t>
             </a:fld>
             <a:endParaRPr lang="en-US"/>
           </a:p>
@@ -2580,7 +2665,7 @@
           <a:p>
             <a:fld id="{67261FD3-3482-D84B-9B44-CD816D3AD191}" type="datetimeFigureOut">
               <a:rPr lang="en-US" smtClean="0"/>
-              <a:t>5/10/23</a:t>
+              <a:t>5/18/23</a:t>
             </a:fld>
             <a:endParaRPr lang="en-US"/>
           </a:p>
@@ -2693,7 +2778,7 @@
           <a:p>
             <a:fld id="{67261FD3-3482-D84B-9B44-CD816D3AD191}" type="datetimeFigureOut">
               <a:rPr lang="en-US" smtClean="0"/>
-              <a:t>5/10/23</a:t>
+              <a:t>5/18/23</a:t>
             </a:fld>
             <a:endParaRPr lang="en-US"/>
           </a:p>
@@ -3006,7 +3091,7 @@
           <a:p>
             <a:fld id="{67261FD3-3482-D84B-9B44-CD816D3AD191}" type="datetimeFigureOut">
               <a:rPr lang="en-US" smtClean="0"/>
-              <a:t>5/10/23</a:t>
+              <a:t>5/18/23</a:t>
             </a:fld>
             <a:endParaRPr lang="en-US"/>
           </a:p>
@@ -3295,7 +3380,7 @@
           <a:p>
             <a:fld id="{67261FD3-3482-D84B-9B44-CD816D3AD191}" type="datetimeFigureOut">
               <a:rPr lang="en-US" smtClean="0"/>
-              <a:t>5/10/23</a:t>
+              <a:t>5/18/23</a:t>
             </a:fld>
             <a:endParaRPr lang="en-US"/>
           </a:p>
@@ -3538,7 +3623,7 @@
           <a:p>
             <a:fld id="{67261FD3-3482-D84B-9B44-CD816D3AD191}" type="datetimeFigureOut">
               <a:rPr lang="en-US" smtClean="0"/>
-              <a:t>5/10/23</a:t>
+              <a:t>5/18/23</a:t>
             </a:fld>
             <a:endParaRPr lang="en-US"/>
           </a:p>
@@ -4518,7 +4603,7 @@
                   <a:schemeClr val="tx1"/>
                 </a:solidFill>
               </a:rPr>
-              <a:t>1000kΩ</a:t>
+              <a:t>1000Ω</a:t>
             </a:r>
           </a:p>
         </p:txBody>
@@ -4579,7 +4664,7 @@
                   <a:schemeClr val="tx1"/>
                 </a:solidFill>
               </a:rPr>
-              <a:t>1000kΩ</a:t>
+              <a:t>1000Ω</a:t>
             </a:r>
           </a:p>
         </p:txBody>
@@ -6130,7 +6215,7 @@
                   <a:schemeClr val="tx1"/>
                 </a:solidFill>
               </a:rPr>
-              <a:t>1000kΩ</a:t>
+              <a:t>1000Ω</a:t>
             </a:r>
           </a:p>
         </p:txBody>
@@ -6794,7 +6879,7 @@
                   <a:schemeClr val="tx1"/>
                 </a:solidFill>
               </a:rPr>
-              <a:t>1000kΩ</a:t>
+              <a:t>1000Ω</a:t>
             </a:r>
           </a:p>
         </p:txBody>
@@ -7611,256 +7696,11 @@
                   <a:schemeClr val="tx1"/>
                 </a:solidFill>
               </a:rPr>
-              <a:t>1000kΩ</a:t>
+              <a:t>1000Ω</a:t>
             </a:r>
           </a:p>
         </p:txBody>
       </p:sp>
-      <p:grpSp>
-        <p:nvGrpSpPr>
-          <p:cNvPr id="27" name="Group 26">
-            <a:extLst>
-              <a:ext uri="{FF2B5EF4-FFF2-40B4-BE49-F238E27FC236}">
-                <a16:creationId xmlns:a16="http://schemas.microsoft.com/office/drawing/2014/main" id="{75F6DB18-3F89-AAC9-38EC-105B6C23F271}"/>
-              </a:ext>
-            </a:extLst>
-          </p:cNvPr>
-          <p:cNvGrpSpPr/>
-          <p:nvPr/>
-        </p:nvGrpSpPr>
-        <p:grpSpPr>
-          <a:xfrm>
-            <a:off x="4933449" y="239989"/>
-            <a:ext cx="2210498" cy="1553661"/>
-            <a:chOff x="2525087" y="859443"/>
-            <a:chExt cx="2210498" cy="1553661"/>
-          </a:xfrm>
-        </p:grpSpPr>
-        <p:cxnSp>
-          <p:nvCxnSpPr>
-            <p:cNvPr id="38" name="Straight Connector 37">
-              <a:extLst>
-                <a:ext uri="{FF2B5EF4-FFF2-40B4-BE49-F238E27FC236}">
-                  <a16:creationId xmlns:a16="http://schemas.microsoft.com/office/drawing/2014/main" id="{5D2583AA-F3B1-68D6-0A55-49FFF628EBCB}"/>
-                </a:ext>
-              </a:extLst>
-            </p:cNvPr>
-            <p:cNvCxnSpPr>
-              <a:cxnSpLocks/>
-            </p:cNvCxnSpPr>
-            <p:nvPr/>
-          </p:nvCxnSpPr>
-          <p:spPr>
-            <a:xfrm flipH="1">
-              <a:off x="2525087" y="1309919"/>
-              <a:ext cx="652448" cy="0"/>
-            </a:xfrm>
-            <a:prstGeom prst="line">
-              <a:avLst/>
-            </a:prstGeom>
-            <a:ln w="57150"/>
-          </p:spPr>
-          <p:style>
-            <a:lnRef idx="1">
-              <a:schemeClr val="accent1"/>
-            </a:lnRef>
-            <a:fillRef idx="0">
-              <a:schemeClr val="accent1"/>
-            </a:fillRef>
-            <a:effectRef idx="0">
-              <a:schemeClr val="accent1"/>
-            </a:effectRef>
-            <a:fontRef idx="minor">
-              <a:schemeClr val="tx1"/>
-            </a:fontRef>
-          </p:style>
-        </p:cxnSp>
-        <p:cxnSp>
-          <p:nvCxnSpPr>
-            <p:cNvPr id="39" name="Straight Connector 38">
-              <a:extLst>
-                <a:ext uri="{FF2B5EF4-FFF2-40B4-BE49-F238E27FC236}">
-                  <a16:creationId xmlns:a16="http://schemas.microsoft.com/office/drawing/2014/main" id="{ADD32EA3-B831-340A-DEA7-DA92A461D32B}"/>
-                </a:ext>
-              </a:extLst>
-            </p:cNvPr>
-            <p:cNvCxnSpPr>
-              <a:cxnSpLocks/>
-            </p:cNvCxnSpPr>
-            <p:nvPr/>
-          </p:nvCxnSpPr>
-          <p:spPr>
-            <a:xfrm flipV="1">
-              <a:off x="2552467" y="1287009"/>
-              <a:ext cx="0" cy="1123281"/>
-            </a:xfrm>
-            <a:prstGeom prst="line">
-              <a:avLst/>
-            </a:prstGeom>
-            <a:ln w="57150"/>
-          </p:spPr>
-          <p:style>
-            <a:lnRef idx="1">
-              <a:schemeClr val="accent1"/>
-            </a:lnRef>
-            <a:fillRef idx="0">
-              <a:schemeClr val="accent1"/>
-            </a:fillRef>
-            <a:effectRef idx="0">
-              <a:schemeClr val="accent1"/>
-            </a:effectRef>
-            <a:fontRef idx="minor">
-              <a:schemeClr val="tx1"/>
-            </a:fontRef>
-          </p:style>
-        </p:cxnSp>
-        <p:cxnSp>
-          <p:nvCxnSpPr>
-            <p:cNvPr id="43" name="Straight Connector 42">
-              <a:extLst>
-                <a:ext uri="{FF2B5EF4-FFF2-40B4-BE49-F238E27FC236}">
-                  <a16:creationId xmlns:a16="http://schemas.microsoft.com/office/drawing/2014/main" id="{6E1C6266-FDF7-104D-4F71-D77ABE445B04}"/>
-                </a:ext>
-              </a:extLst>
-            </p:cNvPr>
-            <p:cNvCxnSpPr>
-              <a:cxnSpLocks/>
-              <a:endCxn id="37" idx="6"/>
-            </p:cNvCxnSpPr>
-            <p:nvPr/>
-          </p:nvCxnSpPr>
-          <p:spPr>
-            <a:xfrm flipH="1">
-              <a:off x="4078488" y="1309920"/>
-              <a:ext cx="657097" cy="0"/>
-            </a:xfrm>
-            <a:prstGeom prst="line">
-              <a:avLst/>
-            </a:prstGeom>
-            <a:ln w="57150"/>
-          </p:spPr>
-          <p:style>
-            <a:lnRef idx="1">
-              <a:schemeClr val="accent1"/>
-            </a:lnRef>
-            <a:fillRef idx="0">
-              <a:schemeClr val="accent1"/>
-            </a:fillRef>
-            <a:effectRef idx="0">
-              <a:schemeClr val="accent1"/>
-            </a:effectRef>
-            <a:fontRef idx="minor">
-              <a:schemeClr val="tx1"/>
-            </a:fontRef>
-          </p:style>
-        </p:cxnSp>
-        <p:sp>
-          <p:nvSpPr>
-            <p:cNvPr id="37" name="Oval 36">
-              <a:extLst>
-                <a:ext uri="{FF2B5EF4-FFF2-40B4-BE49-F238E27FC236}">
-                  <a16:creationId xmlns:a16="http://schemas.microsoft.com/office/drawing/2014/main" id="{C501AFBE-159F-EA31-1122-6E055778148A}"/>
-                </a:ext>
-              </a:extLst>
-            </p:cNvPr>
-            <p:cNvSpPr/>
-            <p:nvPr/>
-          </p:nvSpPr>
-          <p:spPr>
-            <a:xfrm>
-              <a:off x="3177535" y="859443"/>
-              <a:ext cx="900953" cy="900953"/>
-            </a:xfrm>
-            <a:prstGeom prst="ellipse">
-              <a:avLst/>
-            </a:prstGeom>
-            <a:noFill/>
-            <a:ln w="57150">
-              <a:solidFill>
-                <a:srgbClr val="FF0000"/>
-              </a:solidFill>
-            </a:ln>
-          </p:spPr>
-          <p:style>
-            <a:lnRef idx="2">
-              <a:schemeClr val="accent1">
-                <a:shade val="50000"/>
-              </a:schemeClr>
-            </a:lnRef>
-            <a:fillRef idx="1">
-              <a:schemeClr val="accent1"/>
-            </a:fillRef>
-            <a:effectRef idx="0">
-              <a:schemeClr val="accent1"/>
-            </a:effectRef>
-            <a:fontRef idx="minor">
-              <a:schemeClr val="lt1"/>
-            </a:fontRef>
-          </p:style>
-          <p:txBody>
-            <a:bodyPr rtlCol="0" anchor="ctr"/>
-            <a:lstStyle/>
-            <a:p>
-              <a:pPr algn="r"/>
-              <a:r>
-                <a:rPr lang="en-US" sz="3600" b="1" dirty="0">
-                  <a:solidFill>
-                    <a:schemeClr val="tx1"/>
-                  </a:solidFill>
-                </a:rPr>
-                <a:t>V</a:t>
-              </a:r>
-              <a:r>
-                <a:rPr lang="en-US" sz="3600" b="1" baseline="-25000" dirty="0">
-                  <a:solidFill>
-                    <a:schemeClr val="tx1"/>
-                  </a:solidFill>
-                </a:rPr>
-                <a:t>2</a:t>
-              </a:r>
-            </a:p>
-          </p:txBody>
-        </p:sp>
-        <p:cxnSp>
-          <p:nvCxnSpPr>
-            <p:cNvPr id="64" name="Straight Connector 63">
-              <a:extLst>
-                <a:ext uri="{FF2B5EF4-FFF2-40B4-BE49-F238E27FC236}">
-                  <a16:creationId xmlns:a16="http://schemas.microsoft.com/office/drawing/2014/main" id="{A38FC4C4-0289-D0D6-61BF-2A5558BEA287}"/>
-                </a:ext>
-              </a:extLst>
-            </p:cNvPr>
-            <p:cNvCxnSpPr>
-              <a:cxnSpLocks/>
-            </p:cNvCxnSpPr>
-            <p:nvPr/>
-          </p:nvCxnSpPr>
-          <p:spPr>
-            <a:xfrm flipV="1">
-              <a:off x="4709512" y="1289823"/>
-              <a:ext cx="0" cy="1123281"/>
-            </a:xfrm>
-            <a:prstGeom prst="line">
-              <a:avLst/>
-            </a:prstGeom>
-            <a:ln w="57150"/>
-          </p:spPr>
-          <p:style>
-            <a:lnRef idx="1">
-              <a:schemeClr val="accent1"/>
-            </a:lnRef>
-            <a:fillRef idx="0">
-              <a:schemeClr val="accent1"/>
-            </a:fillRef>
-            <a:effectRef idx="0">
-              <a:schemeClr val="accent1"/>
-            </a:effectRef>
-            <a:fontRef idx="minor">
-              <a:schemeClr val="tx1"/>
-            </a:fontRef>
-          </p:style>
-        </p:cxnSp>
-      </p:grpSp>
       <p:grpSp>
         <p:nvGrpSpPr>
           <p:cNvPr id="92" name="Group 91">
@@ -8275,7 +8115,7 @@
                   <a:schemeClr val="tx1"/>
                 </a:solidFill>
               </a:rPr>
-              <a:t>1000kΩ</a:t>
+              <a:t>1000Ω</a:t>
             </a:r>
           </a:p>
         </p:txBody>
@@ -8319,67 +8159,333 @@
           </a:fontRef>
         </p:style>
       </p:cxnSp>
-      <p:sp>
-        <p:nvSpPr>
-          <p:cNvPr id="21" name="Rectangle 20">
-            <a:extLst>
-              <a:ext uri="{FF2B5EF4-FFF2-40B4-BE49-F238E27FC236}">
-                <a16:creationId xmlns:a16="http://schemas.microsoft.com/office/drawing/2014/main" id="{3A0EFE40-D45F-AE13-AA8C-DE1558753E84}"/>
-              </a:ext>
-            </a:extLst>
-          </p:cNvPr>
-          <p:cNvSpPr/>
+      <p:grpSp>
+        <p:nvGrpSpPr>
+          <p:cNvPr id="4" name="Group 3">
+            <a:extLst>
+              <a:ext uri="{FF2B5EF4-FFF2-40B4-BE49-F238E27FC236}">
+                <a16:creationId xmlns:a16="http://schemas.microsoft.com/office/drawing/2014/main" id="{95C3C3C4-22C3-48E3-1BA4-CAD3E5628B35}"/>
+              </a:ext>
+            </a:extLst>
+          </p:cNvPr>
+          <p:cNvGrpSpPr/>
           <p:nvPr/>
-        </p:nvSpPr>
-        <p:spPr>
+        </p:nvGrpSpPr>
+        <p:grpSpPr>
           <a:xfrm>
-            <a:off x="5126031" y="1405423"/>
-            <a:ext cx="1828800" cy="710005"/>
+            <a:off x="4933449" y="239989"/>
+            <a:ext cx="2210498" cy="1875439"/>
+            <a:chOff x="4933449" y="239989"/>
+            <a:chExt cx="2210498" cy="1875439"/>
           </a:xfrm>
-          <a:prstGeom prst="rect">
-            <a:avLst/>
-          </a:prstGeom>
-          <a:solidFill>
-            <a:schemeClr val="bg1"/>
-          </a:solidFill>
-          <a:ln w="57150">
+        </p:grpSpPr>
+        <p:grpSp>
+          <p:nvGrpSpPr>
+            <p:cNvPr id="27" name="Group 26">
+              <a:extLst>
+                <a:ext uri="{FF2B5EF4-FFF2-40B4-BE49-F238E27FC236}">
+                  <a16:creationId xmlns:a16="http://schemas.microsoft.com/office/drawing/2014/main" id="{75F6DB18-3F89-AAC9-38EC-105B6C23F271}"/>
+                </a:ext>
+              </a:extLst>
+            </p:cNvPr>
+            <p:cNvGrpSpPr/>
+            <p:nvPr/>
+          </p:nvGrpSpPr>
+          <p:grpSpPr>
+            <a:xfrm>
+              <a:off x="4933449" y="239989"/>
+              <a:ext cx="2210498" cy="1553661"/>
+              <a:chOff x="2525087" y="859443"/>
+              <a:chExt cx="2210498" cy="1553661"/>
+            </a:xfrm>
+          </p:grpSpPr>
+          <p:cxnSp>
+            <p:nvCxnSpPr>
+              <p:cNvPr id="38" name="Straight Connector 37">
+                <a:extLst>
+                  <a:ext uri="{FF2B5EF4-FFF2-40B4-BE49-F238E27FC236}">
+                    <a16:creationId xmlns:a16="http://schemas.microsoft.com/office/drawing/2014/main" id="{5D2583AA-F3B1-68D6-0A55-49FFF628EBCB}"/>
+                  </a:ext>
+                </a:extLst>
+              </p:cNvPr>
+              <p:cNvCxnSpPr>
+                <a:cxnSpLocks/>
+              </p:cNvCxnSpPr>
+              <p:nvPr/>
+            </p:nvCxnSpPr>
+            <p:spPr>
+              <a:xfrm flipH="1">
+                <a:off x="2525087" y="1309919"/>
+                <a:ext cx="652448" cy="0"/>
+              </a:xfrm>
+              <a:prstGeom prst="line">
+                <a:avLst/>
+              </a:prstGeom>
+              <a:ln w="57150"/>
+            </p:spPr>
+            <p:style>
+              <a:lnRef idx="1">
+                <a:schemeClr val="accent1"/>
+              </a:lnRef>
+              <a:fillRef idx="0">
+                <a:schemeClr val="accent1"/>
+              </a:fillRef>
+              <a:effectRef idx="0">
+                <a:schemeClr val="accent1"/>
+              </a:effectRef>
+              <a:fontRef idx="minor">
+                <a:schemeClr val="tx1"/>
+              </a:fontRef>
+            </p:style>
+          </p:cxnSp>
+          <p:cxnSp>
+            <p:nvCxnSpPr>
+              <p:cNvPr id="39" name="Straight Connector 38">
+                <a:extLst>
+                  <a:ext uri="{FF2B5EF4-FFF2-40B4-BE49-F238E27FC236}">
+                    <a16:creationId xmlns:a16="http://schemas.microsoft.com/office/drawing/2014/main" id="{ADD32EA3-B831-340A-DEA7-DA92A461D32B}"/>
+                  </a:ext>
+                </a:extLst>
+              </p:cNvPr>
+              <p:cNvCxnSpPr>
+                <a:cxnSpLocks/>
+              </p:cNvCxnSpPr>
+              <p:nvPr/>
+            </p:nvCxnSpPr>
+            <p:spPr>
+              <a:xfrm flipV="1">
+                <a:off x="2552467" y="1287009"/>
+                <a:ext cx="0" cy="1123281"/>
+              </a:xfrm>
+              <a:prstGeom prst="line">
+                <a:avLst/>
+              </a:prstGeom>
+              <a:ln w="57150"/>
+            </p:spPr>
+            <p:style>
+              <a:lnRef idx="1">
+                <a:schemeClr val="accent1"/>
+              </a:lnRef>
+              <a:fillRef idx="0">
+                <a:schemeClr val="accent1"/>
+              </a:fillRef>
+              <a:effectRef idx="0">
+                <a:schemeClr val="accent1"/>
+              </a:effectRef>
+              <a:fontRef idx="minor">
+                <a:schemeClr val="tx1"/>
+              </a:fontRef>
+            </p:style>
+          </p:cxnSp>
+          <p:cxnSp>
+            <p:nvCxnSpPr>
+              <p:cNvPr id="43" name="Straight Connector 42">
+                <a:extLst>
+                  <a:ext uri="{FF2B5EF4-FFF2-40B4-BE49-F238E27FC236}">
+                    <a16:creationId xmlns:a16="http://schemas.microsoft.com/office/drawing/2014/main" id="{6E1C6266-FDF7-104D-4F71-D77ABE445B04}"/>
+                  </a:ext>
+                </a:extLst>
+              </p:cNvPr>
+              <p:cNvCxnSpPr>
+                <a:cxnSpLocks/>
+                <a:endCxn id="37" idx="6"/>
+              </p:cNvCxnSpPr>
+              <p:nvPr/>
+            </p:nvCxnSpPr>
+            <p:spPr>
+              <a:xfrm flipH="1">
+                <a:off x="4078488" y="1309920"/>
+                <a:ext cx="657097" cy="0"/>
+              </a:xfrm>
+              <a:prstGeom prst="line">
+                <a:avLst/>
+              </a:prstGeom>
+              <a:ln w="57150"/>
+            </p:spPr>
+            <p:style>
+              <a:lnRef idx="1">
+                <a:schemeClr val="accent1"/>
+              </a:lnRef>
+              <a:fillRef idx="0">
+                <a:schemeClr val="accent1"/>
+              </a:fillRef>
+              <a:effectRef idx="0">
+                <a:schemeClr val="accent1"/>
+              </a:effectRef>
+              <a:fontRef idx="minor">
+                <a:schemeClr val="tx1"/>
+              </a:fontRef>
+            </p:style>
+          </p:cxnSp>
+          <p:sp>
+            <p:nvSpPr>
+              <p:cNvPr id="37" name="Oval 36">
+                <a:extLst>
+                  <a:ext uri="{FF2B5EF4-FFF2-40B4-BE49-F238E27FC236}">
+                    <a16:creationId xmlns:a16="http://schemas.microsoft.com/office/drawing/2014/main" id="{C501AFBE-159F-EA31-1122-6E055778148A}"/>
+                  </a:ext>
+                </a:extLst>
+              </p:cNvPr>
+              <p:cNvSpPr/>
+              <p:nvPr/>
+            </p:nvSpPr>
+            <p:spPr>
+              <a:xfrm>
+                <a:off x="3177535" y="859443"/>
+                <a:ext cx="900953" cy="900953"/>
+              </a:xfrm>
+              <a:prstGeom prst="ellipse">
+                <a:avLst/>
+              </a:prstGeom>
+              <a:noFill/>
+              <a:ln w="57150">
+                <a:solidFill>
+                  <a:srgbClr val="FF0000"/>
+                </a:solidFill>
+              </a:ln>
+            </p:spPr>
+            <p:style>
+              <a:lnRef idx="2">
+                <a:schemeClr val="accent1">
+                  <a:shade val="50000"/>
+                </a:schemeClr>
+              </a:lnRef>
+              <a:fillRef idx="1">
+                <a:schemeClr val="accent1"/>
+              </a:fillRef>
+              <a:effectRef idx="0">
+                <a:schemeClr val="accent1"/>
+              </a:effectRef>
+              <a:fontRef idx="minor">
+                <a:schemeClr val="lt1"/>
+              </a:fontRef>
+            </p:style>
+            <p:txBody>
+              <a:bodyPr rtlCol="0" anchor="ctr"/>
+              <a:lstStyle/>
+              <a:p>
+                <a:pPr algn="r"/>
+                <a:r>
+                  <a:rPr lang="en-US" sz="3600" b="1" dirty="0">
+                    <a:solidFill>
+                      <a:schemeClr val="tx1"/>
+                    </a:solidFill>
+                  </a:rPr>
+                  <a:t>V</a:t>
+                </a:r>
+                <a:r>
+                  <a:rPr lang="en-US" sz="3600" b="1" baseline="-25000" dirty="0">
+                    <a:solidFill>
+                      <a:schemeClr val="tx1"/>
+                    </a:solidFill>
+                  </a:rPr>
+                  <a:t>2</a:t>
+                </a:r>
+              </a:p>
+            </p:txBody>
+          </p:sp>
+          <p:cxnSp>
+            <p:nvCxnSpPr>
+              <p:cNvPr id="64" name="Straight Connector 63">
+                <a:extLst>
+                  <a:ext uri="{FF2B5EF4-FFF2-40B4-BE49-F238E27FC236}">
+                    <a16:creationId xmlns:a16="http://schemas.microsoft.com/office/drawing/2014/main" id="{A38FC4C4-0289-D0D6-61BF-2A5558BEA287}"/>
+                  </a:ext>
+                </a:extLst>
+              </p:cNvPr>
+              <p:cNvCxnSpPr>
+                <a:cxnSpLocks/>
+              </p:cNvCxnSpPr>
+              <p:nvPr/>
+            </p:nvCxnSpPr>
+            <p:spPr>
+              <a:xfrm flipV="1">
+                <a:off x="4709512" y="1289823"/>
+                <a:ext cx="0" cy="1123281"/>
+              </a:xfrm>
+              <a:prstGeom prst="line">
+                <a:avLst/>
+              </a:prstGeom>
+              <a:ln w="57150"/>
+            </p:spPr>
+            <p:style>
+              <a:lnRef idx="1">
+                <a:schemeClr val="accent1"/>
+              </a:lnRef>
+              <a:fillRef idx="0">
+                <a:schemeClr val="accent1"/>
+              </a:fillRef>
+              <a:effectRef idx="0">
+                <a:schemeClr val="accent1"/>
+              </a:effectRef>
+              <a:fontRef idx="minor">
+                <a:schemeClr val="tx1"/>
+              </a:fontRef>
+            </p:style>
+          </p:cxnSp>
+        </p:grpSp>
+        <p:sp>
+          <p:nvSpPr>
+            <p:cNvPr id="21" name="Rectangle 20">
+              <a:extLst>
+                <a:ext uri="{FF2B5EF4-FFF2-40B4-BE49-F238E27FC236}">
+                  <a16:creationId xmlns:a16="http://schemas.microsoft.com/office/drawing/2014/main" id="{3A0EFE40-D45F-AE13-AA8C-DE1558753E84}"/>
+                </a:ext>
+              </a:extLst>
+            </p:cNvPr>
+            <p:cNvSpPr/>
+            <p:nvPr/>
+          </p:nvSpPr>
+          <p:spPr>
+            <a:xfrm>
+              <a:off x="5126031" y="1405423"/>
+              <a:ext cx="1828800" cy="710005"/>
+            </a:xfrm>
+            <a:prstGeom prst="rect">
+              <a:avLst/>
+            </a:prstGeom>
             <a:solidFill>
-              <a:schemeClr val="accent1"/>
+              <a:schemeClr val="bg1"/>
             </a:solidFill>
-          </a:ln>
-        </p:spPr>
-        <p:style>
-          <a:lnRef idx="2">
-            <a:schemeClr val="accent1">
-              <a:shade val="50000"/>
-            </a:schemeClr>
-          </a:lnRef>
-          <a:fillRef idx="1">
-            <a:schemeClr val="accent1"/>
-          </a:fillRef>
-          <a:effectRef idx="0">
-            <a:schemeClr val="accent1"/>
-          </a:effectRef>
-          <a:fontRef idx="minor">
-            <a:schemeClr val="lt1"/>
-          </a:fontRef>
-        </p:style>
-        <p:txBody>
-          <a:bodyPr rtlCol="0" anchor="ctr"/>
-          <a:lstStyle/>
-          <a:p>
-            <a:pPr algn="ctr"/>
-            <a:r>
-              <a:rPr lang="en-US" sz="3600" b="1" dirty="0">
-                <a:solidFill>
-                  <a:schemeClr val="tx1"/>
-                </a:solidFill>
-              </a:rPr>
-              <a:t>820Ω</a:t>
-            </a:r>
-          </a:p>
-        </p:txBody>
-      </p:sp>
+            <a:ln w="57150">
+              <a:solidFill>
+                <a:schemeClr val="accent1"/>
+              </a:solidFill>
+            </a:ln>
+          </p:spPr>
+          <p:style>
+            <a:lnRef idx="2">
+              <a:schemeClr val="accent1">
+                <a:shade val="50000"/>
+              </a:schemeClr>
+            </a:lnRef>
+            <a:fillRef idx="1">
+              <a:schemeClr val="accent1"/>
+            </a:fillRef>
+            <a:effectRef idx="0">
+              <a:schemeClr val="accent1"/>
+            </a:effectRef>
+            <a:fontRef idx="minor">
+              <a:schemeClr val="lt1"/>
+            </a:fontRef>
+          </p:style>
+          <p:txBody>
+            <a:bodyPr rtlCol="0" anchor="ctr"/>
+            <a:lstStyle/>
+            <a:p>
+              <a:pPr algn="ctr"/>
+              <a:r>
+                <a:rPr lang="en-US" sz="3600" b="1" dirty="0">
+                  <a:solidFill>
+                    <a:schemeClr val="tx1"/>
+                  </a:solidFill>
+                </a:rPr>
+                <a:t>820Ω</a:t>
+              </a:r>
+            </a:p>
+          </p:txBody>
+        </p:sp>
+      </p:grpSp>
       <p:sp>
         <p:nvSpPr>
           <p:cNvPr id="47" name="Oval 46">
@@ -8601,6 +8707,2365 @@
 </file>
 
 <file path=ppt/slides/slide4.xml><?xml version="1.0" encoding="utf-8"?>
+<p:sld xmlns:a="http://schemas.openxmlformats.org/drawingml/2006/main" xmlns:r="http://schemas.openxmlformats.org/officeDocument/2006/relationships" xmlns:p="http://schemas.openxmlformats.org/presentationml/2006/main">
+  <p:cSld>
+    <p:spTree>
+      <p:nvGrpSpPr>
+        <p:cNvPr id="1" name=""/>
+        <p:cNvGrpSpPr/>
+        <p:nvPr/>
+      </p:nvGrpSpPr>
+      <p:grpSpPr>
+        <a:xfrm>
+          <a:off x="0" y="0"/>
+          <a:ext cx="0" cy="0"/>
+          <a:chOff x="0" y="0"/>
+          <a:chExt cx="0" cy="0"/>
+        </a:xfrm>
+      </p:grpSpPr>
+      <p:cxnSp>
+        <p:nvCxnSpPr>
+          <p:cNvPr id="5" name="Straight Connector 4">
+            <a:extLst>
+              <a:ext uri="{FF2B5EF4-FFF2-40B4-BE49-F238E27FC236}">
+                <a16:creationId xmlns:a16="http://schemas.microsoft.com/office/drawing/2014/main" id="{5C5FE9BA-B6B0-0605-0D10-975BE6A0FA58}"/>
+              </a:ext>
+            </a:extLst>
+          </p:cNvPr>
+          <p:cNvCxnSpPr>
+            <a:cxnSpLocks/>
+          </p:cNvCxnSpPr>
+          <p:nvPr/>
+        </p:nvCxnSpPr>
+        <p:spPr>
+          <a:xfrm>
+            <a:off x="5932842" y="5228216"/>
+            <a:ext cx="0" cy="720763"/>
+          </a:xfrm>
+          <a:prstGeom prst="line">
+            <a:avLst/>
+          </a:prstGeom>
+          <a:ln w="57150"/>
+        </p:spPr>
+        <p:style>
+          <a:lnRef idx="1">
+            <a:schemeClr val="accent1"/>
+          </a:lnRef>
+          <a:fillRef idx="0">
+            <a:schemeClr val="accent1"/>
+          </a:fillRef>
+          <a:effectRef idx="0">
+            <a:schemeClr val="accent1"/>
+          </a:effectRef>
+          <a:fontRef idx="minor">
+            <a:schemeClr val="tx1"/>
+          </a:fontRef>
+        </p:style>
+      </p:cxnSp>
+      <p:cxnSp>
+        <p:nvCxnSpPr>
+          <p:cNvPr id="7" name="Straight Connector 6">
+            <a:extLst>
+              <a:ext uri="{FF2B5EF4-FFF2-40B4-BE49-F238E27FC236}">
+                <a16:creationId xmlns:a16="http://schemas.microsoft.com/office/drawing/2014/main" id="{D94B5C1A-DDC4-6138-5893-E303FB301EA0}"/>
+              </a:ext>
+            </a:extLst>
+          </p:cNvPr>
+          <p:cNvCxnSpPr>
+            <a:cxnSpLocks/>
+          </p:cNvCxnSpPr>
+          <p:nvPr/>
+        </p:nvCxnSpPr>
+        <p:spPr>
+          <a:xfrm>
+            <a:off x="6096000" y="5443369"/>
+            <a:ext cx="0" cy="313765"/>
+          </a:xfrm>
+          <a:prstGeom prst="line">
+            <a:avLst/>
+          </a:prstGeom>
+          <a:ln w="57150"/>
+        </p:spPr>
+        <p:style>
+          <a:lnRef idx="1">
+            <a:schemeClr val="accent1"/>
+          </a:lnRef>
+          <a:fillRef idx="0">
+            <a:schemeClr val="accent1"/>
+          </a:fillRef>
+          <a:effectRef idx="0">
+            <a:schemeClr val="accent1"/>
+          </a:effectRef>
+          <a:fontRef idx="minor">
+            <a:schemeClr val="tx1"/>
+          </a:fontRef>
+        </p:style>
+      </p:cxnSp>
+      <p:cxnSp>
+        <p:nvCxnSpPr>
+          <p:cNvPr id="9" name="Straight Connector 8">
+            <a:extLst>
+              <a:ext uri="{FF2B5EF4-FFF2-40B4-BE49-F238E27FC236}">
+                <a16:creationId xmlns:a16="http://schemas.microsoft.com/office/drawing/2014/main" id="{682AD043-2E0D-1D6B-9443-FDC0AB182583}"/>
+              </a:ext>
+            </a:extLst>
+          </p:cNvPr>
+          <p:cNvCxnSpPr>
+            <a:cxnSpLocks/>
+          </p:cNvCxnSpPr>
+          <p:nvPr/>
+        </p:nvCxnSpPr>
+        <p:spPr>
+          <a:xfrm flipH="1">
+            <a:off x="6096000" y="5606528"/>
+            <a:ext cx="4129143" cy="0"/>
+          </a:xfrm>
+          <a:prstGeom prst="line">
+            <a:avLst/>
+          </a:prstGeom>
+          <a:ln w="57150"/>
+        </p:spPr>
+        <p:style>
+          <a:lnRef idx="1">
+            <a:schemeClr val="accent1"/>
+          </a:lnRef>
+          <a:fillRef idx="0">
+            <a:schemeClr val="accent1"/>
+          </a:fillRef>
+          <a:effectRef idx="0">
+            <a:schemeClr val="accent1"/>
+          </a:effectRef>
+          <a:fontRef idx="minor">
+            <a:schemeClr val="tx1"/>
+          </a:fontRef>
+        </p:style>
+      </p:cxnSp>
+      <p:cxnSp>
+        <p:nvCxnSpPr>
+          <p:cNvPr id="12" name="Straight Connector 11">
+            <a:extLst>
+              <a:ext uri="{FF2B5EF4-FFF2-40B4-BE49-F238E27FC236}">
+                <a16:creationId xmlns:a16="http://schemas.microsoft.com/office/drawing/2014/main" id="{DDF0F349-A166-E7BE-E43C-3AB6E9D0ACB5}"/>
+              </a:ext>
+            </a:extLst>
+          </p:cNvPr>
+          <p:cNvCxnSpPr>
+            <a:cxnSpLocks/>
+          </p:cNvCxnSpPr>
+          <p:nvPr/>
+        </p:nvCxnSpPr>
+        <p:spPr>
+          <a:xfrm flipH="1">
+            <a:off x="1803699" y="5601504"/>
+            <a:ext cx="4129143" cy="0"/>
+          </a:xfrm>
+          <a:prstGeom prst="line">
+            <a:avLst/>
+          </a:prstGeom>
+          <a:ln w="57150"/>
+        </p:spPr>
+        <p:style>
+          <a:lnRef idx="1">
+            <a:schemeClr val="accent1"/>
+          </a:lnRef>
+          <a:fillRef idx="0">
+            <a:schemeClr val="accent1"/>
+          </a:fillRef>
+          <a:effectRef idx="0">
+            <a:schemeClr val="accent1"/>
+          </a:effectRef>
+          <a:fontRef idx="minor">
+            <a:schemeClr val="tx1"/>
+          </a:fontRef>
+        </p:style>
+      </p:cxnSp>
+      <p:cxnSp>
+        <p:nvCxnSpPr>
+          <p:cNvPr id="15" name="Straight Connector 14">
+            <a:extLst>
+              <a:ext uri="{FF2B5EF4-FFF2-40B4-BE49-F238E27FC236}">
+                <a16:creationId xmlns:a16="http://schemas.microsoft.com/office/drawing/2014/main" id="{04F8A575-38FA-7FEA-06DE-4C6CF8234A57}"/>
+              </a:ext>
+            </a:extLst>
+          </p:cNvPr>
+          <p:cNvCxnSpPr>
+            <a:cxnSpLocks/>
+          </p:cNvCxnSpPr>
+          <p:nvPr/>
+        </p:nvCxnSpPr>
+        <p:spPr>
+          <a:xfrm>
+            <a:off x="1827006" y="2387162"/>
+            <a:ext cx="0" cy="3234605"/>
+          </a:xfrm>
+          <a:prstGeom prst="line">
+            <a:avLst/>
+          </a:prstGeom>
+          <a:ln w="57150"/>
+        </p:spPr>
+        <p:style>
+          <a:lnRef idx="1">
+            <a:schemeClr val="accent1"/>
+          </a:lnRef>
+          <a:fillRef idx="0">
+            <a:schemeClr val="accent1"/>
+          </a:fillRef>
+          <a:effectRef idx="0">
+            <a:schemeClr val="accent1"/>
+          </a:effectRef>
+          <a:fontRef idx="minor">
+            <a:schemeClr val="tx1"/>
+          </a:fontRef>
+        </p:style>
+      </p:cxnSp>
+      <p:cxnSp>
+        <p:nvCxnSpPr>
+          <p:cNvPr id="23" name="Straight Connector 22">
+            <a:extLst>
+              <a:ext uri="{FF2B5EF4-FFF2-40B4-BE49-F238E27FC236}">
+                <a16:creationId xmlns:a16="http://schemas.microsoft.com/office/drawing/2014/main" id="{BE3A0484-1B35-3823-544F-17AF1569ECBB}"/>
+              </a:ext>
+            </a:extLst>
+          </p:cNvPr>
+          <p:cNvCxnSpPr>
+            <a:cxnSpLocks/>
+          </p:cNvCxnSpPr>
+          <p:nvPr/>
+        </p:nvCxnSpPr>
+        <p:spPr>
+          <a:xfrm>
+            <a:off x="10204337" y="2387162"/>
+            <a:ext cx="0" cy="3242226"/>
+          </a:xfrm>
+          <a:prstGeom prst="line">
+            <a:avLst/>
+          </a:prstGeom>
+          <a:ln w="57150"/>
+        </p:spPr>
+        <p:style>
+          <a:lnRef idx="1">
+            <a:schemeClr val="accent1"/>
+          </a:lnRef>
+          <a:fillRef idx="0">
+            <a:schemeClr val="accent1"/>
+          </a:fillRef>
+          <a:effectRef idx="0">
+            <a:schemeClr val="accent1"/>
+          </a:effectRef>
+          <a:fontRef idx="minor">
+            <a:schemeClr val="tx1"/>
+          </a:fontRef>
+        </p:style>
+      </p:cxnSp>
+      <p:cxnSp>
+        <p:nvCxnSpPr>
+          <p:cNvPr id="25" name="Straight Connector 24">
+            <a:extLst>
+              <a:ext uri="{FF2B5EF4-FFF2-40B4-BE49-F238E27FC236}">
+                <a16:creationId xmlns:a16="http://schemas.microsoft.com/office/drawing/2014/main" id="{F189F3E8-DFF2-425B-C8CF-B23FEE622DF3}"/>
+              </a:ext>
+            </a:extLst>
+          </p:cNvPr>
+          <p:cNvCxnSpPr>
+            <a:cxnSpLocks/>
+          </p:cNvCxnSpPr>
+          <p:nvPr/>
+        </p:nvCxnSpPr>
+        <p:spPr>
+          <a:xfrm flipH="1">
+            <a:off x="8294245" y="2361136"/>
+            <a:ext cx="1920139" cy="0"/>
+          </a:xfrm>
+          <a:prstGeom prst="line">
+            <a:avLst/>
+          </a:prstGeom>
+          <a:ln w="57150"/>
+        </p:spPr>
+        <p:style>
+          <a:lnRef idx="1">
+            <a:schemeClr val="accent1"/>
+          </a:lnRef>
+          <a:fillRef idx="0">
+            <a:schemeClr val="accent1"/>
+          </a:fillRef>
+          <a:effectRef idx="0">
+            <a:schemeClr val="accent1"/>
+          </a:effectRef>
+          <a:fontRef idx="minor">
+            <a:schemeClr val="tx1"/>
+          </a:fontRef>
+        </p:style>
+      </p:cxnSp>
+      <p:sp>
+        <p:nvSpPr>
+          <p:cNvPr id="13" name="Oval 12">
+            <a:extLst>
+              <a:ext uri="{FF2B5EF4-FFF2-40B4-BE49-F238E27FC236}">
+                <a16:creationId xmlns:a16="http://schemas.microsoft.com/office/drawing/2014/main" id="{5561356F-7D8B-4287-358A-59A9826A5825}"/>
+              </a:ext>
+            </a:extLst>
+          </p:cNvPr>
+          <p:cNvSpPr/>
+          <p:nvPr/>
+        </p:nvSpPr>
+        <p:spPr>
+          <a:xfrm>
+            <a:off x="1376529" y="3746776"/>
+            <a:ext cx="900953" cy="900953"/>
+          </a:xfrm>
+          <a:prstGeom prst="ellipse">
+            <a:avLst/>
+          </a:prstGeom>
+          <a:solidFill>
+            <a:schemeClr val="bg1"/>
+          </a:solidFill>
+          <a:ln w="57150">
+            <a:solidFill>
+              <a:schemeClr val="accent2"/>
+            </a:solidFill>
+          </a:ln>
+        </p:spPr>
+        <p:style>
+          <a:lnRef idx="2">
+            <a:schemeClr val="accent1">
+              <a:shade val="50000"/>
+            </a:schemeClr>
+          </a:lnRef>
+          <a:fillRef idx="1">
+            <a:schemeClr val="accent1"/>
+          </a:fillRef>
+          <a:effectRef idx="0">
+            <a:schemeClr val="accent1"/>
+          </a:effectRef>
+          <a:fontRef idx="minor">
+            <a:schemeClr val="lt1"/>
+          </a:fontRef>
+        </p:style>
+        <p:txBody>
+          <a:bodyPr rtlCol="0" anchor="ctr"/>
+          <a:lstStyle/>
+          <a:p>
+            <a:pPr algn="r"/>
+            <a:r>
+              <a:rPr lang="en-US" sz="3600" b="1" dirty="0">
+                <a:solidFill>
+                  <a:schemeClr val="tx1"/>
+                </a:solidFill>
+              </a:rPr>
+              <a:t>A</a:t>
+            </a:r>
+            <a:r>
+              <a:rPr lang="en-US" sz="3600" b="1" baseline="-25000" dirty="0">
+                <a:solidFill>
+                  <a:schemeClr val="tx1"/>
+                </a:solidFill>
+              </a:rPr>
+              <a:t>1</a:t>
+            </a:r>
+          </a:p>
+        </p:txBody>
+      </p:sp>
+      <p:sp>
+        <p:nvSpPr>
+          <p:cNvPr id="76" name="TextBox 75">
+            <a:extLst>
+              <a:ext uri="{FF2B5EF4-FFF2-40B4-BE49-F238E27FC236}">
+                <a16:creationId xmlns:a16="http://schemas.microsoft.com/office/drawing/2014/main" id="{031BFEB0-7E10-049C-3CBB-028A4BB69D4E}"/>
+              </a:ext>
+            </a:extLst>
+          </p:cNvPr>
+          <p:cNvSpPr txBox="1"/>
+          <p:nvPr/>
+        </p:nvSpPr>
+        <p:spPr>
+          <a:xfrm>
+            <a:off x="5577805" y="5859134"/>
+            <a:ext cx="925253" cy="646331"/>
+          </a:xfrm>
+          <a:prstGeom prst="rect">
+            <a:avLst/>
+          </a:prstGeom>
+          <a:noFill/>
+        </p:spPr>
+        <p:txBody>
+          <a:bodyPr wrap="none" rtlCol="0">
+            <a:spAutoFit/>
+          </a:bodyPr>
+          <a:lstStyle/>
+          <a:p>
+            <a:r>
+              <a:rPr lang="en-US" sz="3600" b="1" dirty="0"/>
+              <a:t>12V</a:t>
+            </a:r>
+          </a:p>
+        </p:txBody>
+      </p:sp>
+      <p:grpSp>
+        <p:nvGrpSpPr>
+          <p:cNvPr id="2" name="Group 1">
+            <a:extLst>
+              <a:ext uri="{FF2B5EF4-FFF2-40B4-BE49-F238E27FC236}">
+                <a16:creationId xmlns:a16="http://schemas.microsoft.com/office/drawing/2014/main" id="{E0A21929-3050-9F51-4D83-A1ED53ADE662}"/>
+              </a:ext>
+            </a:extLst>
+          </p:cNvPr>
+          <p:cNvGrpSpPr/>
+          <p:nvPr/>
+        </p:nvGrpSpPr>
+        <p:grpSpPr>
+          <a:xfrm>
+            <a:off x="7641797" y="4037108"/>
+            <a:ext cx="2210498" cy="1867661"/>
+            <a:chOff x="7279679" y="861642"/>
+            <a:chExt cx="2210498" cy="1867661"/>
+          </a:xfrm>
+        </p:grpSpPr>
+        <p:sp>
+          <p:nvSpPr>
+            <p:cNvPr id="21" name="Rectangle 20">
+              <a:extLst>
+                <a:ext uri="{FF2B5EF4-FFF2-40B4-BE49-F238E27FC236}">
+                  <a16:creationId xmlns:a16="http://schemas.microsoft.com/office/drawing/2014/main" id="{3A0EFE40-D45F-AE13-AA8C-DE1558753E84}"/>
+                </a:ext>
+              </a:extLst>
+            </p:cNvPr>
+            <p:cNvSpPr/>
+            <p:nvPr/>
+          </p:nvSpPr>
+          <p:spPr>
+            <a:xfrm>
+              <a:off x="7464015" y="2019298"/>
+              <a:ext cx="1828800" cy="710005"/>
+            </a:xfrm>
+            <a:prstGeom prst="rect">
+              <a:avLst/>
+            </a:prstGeom>
+            <a:solidFill>
+              <a:schemeClr val="bg1"/>
+            </a:solidFill>
+            <a:ln w="57150">
+              <a:solidFill>
+                <a:schemeClr val="accent1"/>
+              </a:solidFill>
+            </a:ln>
+          </p:spPr>
+          <p:style>
+            <a:lnRef idx="2">
+              <a:schemeClr val="accent1">
+                <a:shade val="50000"/>
+              </a:schemeClr>
+            </a:lnRef>
+            <a:fillRef idx="1">
+              <a:schemeClr val="accent1"/>
+            </a:fillRef>
+            <a:effectRef idx="0">
+              <a:schemeClr val="accent1"/>
+            </a:effectRef>
+            <a:fontRef idx="minor">
+              <a:schemeClr val="lt1"/>
+            </a:fontRef>
+          </p:style>
+          <p:txBody>
+            <a:bodyPr rtlCol="0" anchor="ctr"/>
+            <a:lstStyle/>
+            <a:p>
+              <a:pPr algn="ctr"/>
+              <a:r>
+                <a:rPr lang="en-US" sz="3600" b="1" dirty="0">
+                  <a:solidFill>
+                    <a:schemeClr val="tx1"/>
+                  </a:solidFill>
+                </a:rPr>
+                <a:t>820Ω</a:t>
+              </a:r>
+            </a:p>
+          </p:txBody>
+        </p:sp>
+        <p:grpSp>
+          <p:nvGrpSpPr>
+            <p:cNvPr id="85" name="Group 84">
+              <a:extLst>
+                <a:ext uri="{FF2B5EF4-FFF2-40B4-BE49-F238E27FC236}">
+                  <a16:creationId xmlns:a16="http://schemas.microsoft.com/office/drawing/2014/main" id="{FCBC2A39-C787-5D42-F8A5-B45D739180F2}"/>
+                </a:ext>
+              </a:extLst>
+            </p:cNvPr>
+            <p:cNvGrpSpPr/>
+            <p:nvPr/>
+          </p:nvGrpSpPr>
+          <p:grpSpPr>
+            <a:xfrm>
+              <a:off x="7279679" y="861642"/>
+              <a:ext cx="2210498" cy="1553661"/>
+              <a:chOff x="2525087" y="859443"/>
+              <a:chExt cx="2210498" cy="1553661"/>
+            </a:xfrm>
+          </p:grpSpPr>
+          <p:cxnSp>
+            <p:nvCxnSpPr>
+              <p:cNvPr id="86" name="Straight Connector 85">
+                <a:extLst>
+                  <a:ext uri="{FF2B5EF4-FFF2-40B4-BE49-F238E27FC236}">
+                    <a16:creationId xmlns:a16="http://schemas.microsoft.com/office/drawing/2014/main" id="{3DE0CA1B-543D-A776-B045-0FD5B1F96312}"/>
+                  </a:ext>
+                </a:extLst>
+              </p:cNvPr>
+              <p:cNvCxnSpPr>
+                <a:cxnSpLocks/>
+              </p:cNvCxnSpPr>
+              <p:nvPr/>
+            </p:nvCxnSpPr>
+            <p:spPr>
+              <a:xfrm flipH="1">
+                <a:off x="2525087" y="1309919"/>
+                <a:ext cx="652448" cy="0"/>
+              </a:xfrm>
+              <a:prstGeom prst="line">
+                <a:avLst/>
+              </a:prstGeom>
+              <a:ln w="57150"/>
+            </p:spPr>
+            <p:style>
+              <a:lnRef idx="1">
+                <a:schemeClr val="accent1"/>
+              </a:lnRef>
+              <a:fillRef idx="0">
+                <a:schemeClr val="accent1"/>
+              </a:fillRef>
+              <a:effectRef idx="0">
+                <a:schemeClr val="accent1"/>
+              </a:effectRef>
+              <a:fontRef idx="minor">
+                <a:schemeClr val="tx1"/>
+              </a:fontRef>
+            </p:style>
+          </p:cxnSp>
+          <p:cxnSp>
+            <p:nvCxnSpPr>
+              <p:cNvPr id="88" name="Straight Connector 87">
+                <a:extLst>
+                  <a:ext uri="{FF2B5EF4-FFF2-40B4-BE49-F238E27FC236}">
+                    <a16:creationId xmlns:a16="http://schemas.microsoft.com/office/drawing/2014/main" id="{4DCD5E50-1AF2-FA42-BB15-A99F9E0B31D5}"/>
+                  </a:ext>
+                </a:extLst>
+              </p:cNvPr>
+              <p:cNvCxnSpPr>
+                <a:cxnSpLocks/>
+              </p:cNvCxnSpPr>
+              <p:nvPr/>
+            </p:nvCxnSpPr>
+            <p:spPr>
+              <a:xfrm flipV="1">
+                <a:off x="2552467" y="1287009"/>
+                <a:ext cx="0" cy="1123281"/>
+              </a:xfrm>
+              <a:prstGeom prst="line">
+                <a:avLst/>
+              </a:prstGeom>
+              <a:ln w="57150"/>
+            </p:spPr>
+            <p:style>
+              <a:lnRef idx="1">
+                <a:schemeClr val="accent1"/>
+              </a:lnRef>
+              <a:fillRef idx="0">
+                <a:schemeClr val="accent1"/>
+              </a:fillRef>
+              <a:effectRef idx="0">
+                <a:schemeClr val="accent1"/>
+              </a:effectRef>
+              <a:fontRef idx="minor">
+                <a:schemeClr val="tx1"/>
+              </a:fontRef>
+            </p:style>
+          </p:cxnSp>
+          <p:cxnSp>
+            <p:nvCxnSpPr>
+              <p:cNvPr id="89" name="Straight Connector 88">
+                <a:extLst>
+                  <a:ext uri="{FF2B5EF4-FFF2-40B4-BE49-F238E27FC236}">
+                    <a16:creationId xmlns:a16="http://schemas.microsoft.com/office/drawing/2014/main" id="{D19ED824-53BD-834B-CFFD-143ED3AE28F8}"/>
+                  </a:ext>
+                </a:extLst>
+              </p:cNvPr>
+              <p:cNvCxnSpPr>
+                <a:cxnSpLocks/>
+                <a:endCxn id="90" idx="6"/>
+              </p:cNvCxnSpPr>
+              <p:nvPr/>
+            </p:nvCxnSpPr>
+            <p:spPr>
+              <a:xfrm flipH="1">
+                <a:off x="4078488" y="1309920"/>
+                <a:ext cx="657097" cy="0"/>
+              </a:xfrm>
+              <a:prstGeom prst="line">
+                <a:avLst/>
+              </a:prstGeom>
+              <a:ln w="57150"/>
+            </p:spPr>
+            <p:style>
+              <a:lnRef idx="1">
+                <a:schemeClr val="accent1"/>
+              </a:lnRef>
+              <a:fillRef idx="0">
+                <a:schemeClr val="accent1"/>
+              </a:fillRef>
+              <a:effectRef idx="0">
+                <a:schemeClr val="accent1"/>
+              </a:effectRef>
+              <a:fontRef idx="minor">
+                <a:schemeClr val="tx1"/>
+              </a:fontRef>
+            </p:style>
+          </p:cxnSp>
+          <p:sp>
+            <p:nvSpPr>
+              <p:cNvPr id="90" name="Oval 89">
+                <a:extLst>
+                  <a:ext uri="{FF2B5EF4-FFF2-40B4-BE49-F238E27FC236}">
+                    <a16:creationId xmlns:a16="http://schemas.microsoft.com/office/drawing/2014/main" id="{8BCEADCD-3663-BB72-16A0-6A64E01C3614}"/>
+                  </a:ext>
+                </a:extLst>
+              </p:cNvPr>
+              <p:cNvSpPr/>
+              <p:nvPr/>
+            </p:nvSpPr>
+            <p:spPr>
+              <a:xfrm>
+                <a:off x="3177535" y="859443"/>
+                <a:ext cx="900953" cy="900953"/>
+              </a:xfrm>
+              <a:prstGeom prst="ellipse">
+                <a:avLst/>
+              </a:prstGeom>
+              <a:noFill/>
+              <a:ln w="57150">
+                <a:solidFill>
+                  <a:srgbClr val="FF0000"/>
+                </a:solidFill>
+              </a:ln>
+            </p:spPr>
+            <p:style>
+              <a:lnRef idx="2">
+                <a:schemeClr val="accent1">
+                  <a:shade val="50000"/>
+                </a:schemeClr>
+              </a:lnRef>
+              <a:fillRef idx="1">
+                <a:schemeClr val="accent1"/>
+              </a:fillRef>
+              <a:effectRef idx="0">
+                <a:schemeClr val="accent1"/>
+              </a:effectRef>
+              <a:fontRef idx="minor">
+                <a:schemeClr val="lt1"/>
+              </a:fontRef>
+            </p:style>
+            <p:txBody>
+              <a:bodyPr rtlCol="0" anchor="ctr"/>
+              <a:lstStyle/>
+              <a:p>
+                <a:pPr algn="r"/>
+                <a:r>
+                  <a:rPr lang="en-US" sz="3600" b="1" dirty="0">
+                    <a:solidFill>
+                      <a:schemeClr val="tx1"/>
+                    </a:solidFill>
+                  </a:rPr>
+                  <a:t>V</a:t>
+                </a:r>
+                <a:r>
+                  <a:rPr lang="en-US" sz="3600" b="1" baseline="-25000" dirty="0">
+                    <a:solidFill>
+                      <a:schemeClr val="tx1"/>
+                    </a:solidFill>
+                  </a:rPr>
+                  <a:t>2</a:t>
+                </a:r>
+              </a:p>
+            </p:txBody>
+          </p:sp>
+          <p:cxnSp>
+            <p:nvCxnSpPr>
+              <p:cNvPr id="91" name="Straight Connector 90">
+                <a:extLst>
+                  <a:ext uri="{FF2B5EF4-FFF2-40B4-BE49-F238E27FC236}">
+                    <a16:creationId xmlns:a16="http://schemas.microsoft.com/office/drawing/2014/main" id="{C551E562-1A57-6A52-727C-10C39CC6ACA5}"/>
+                  </a:ext>
+                </a:extLst>
+              </p:cNvPr>
+              <p:cNvCxnSpPr>
+                <a:cxnSpLocks/>
+              </p:cNvCxnSpPr>
+              <p:nvPr/>
+            </p:nvCxnSpPr>
+            <p:spPr>
+              <a:xfrm flipV="1">
+                <a:off x="4709512" y="1289823"/>
+                <a:ext cx="0" cy="1123281"/>
+              </a:xfrm>
+              <a:prstGeom prst="line">
+                <a:avLst/>
+              </a:prstGeom>
+              <a:ln w="57150"/>
+            </p:spPr>
+            <p:style>
+              <a:lnRef idx="1">
+                <a:schemeClr val="accent1"/>
+              </a:lnRef>
+              <a:fillRef idx="0">
+                <a:schemeClr val="accent1"/>
+              </a:fillRef>
+              <a:effectRef idx="0">
+                <a:schemeClr val="accent1"/>
+              </a:effectRef>
+              <a:fontRef idx="minor">
+                <a:schemeClr val="tx1"/>
+              </a:fontRef>
+            </p:style>
+          </p:cxnSp>
+        </p:grpSp>
+      </p:grpSp>
+      <p:grpSp>
+        <p:nvGrpSpPr>
+          <p:cNvPr id="92" name="Group 91">
+            <a:extLst>
+              <a:ext uri="{FF2B5EF4-FFF2-40B4-BE49-F238E27FC236}">
+                <a16:creationId xmlns:a16="http://schemas.microsoft.com/office/drawing/2014/main" id="{8460F570-2896-57FD-400C-FE6A653986B6}"/>
+              </a:ext>
+            </a:extLst>
+          </p:cNvPr>
+          <p:cNvGrpSpPr/>
+          <p:nvPr/>
+        </p:nvGrpSpPr>
+        <p:grpSpPr>
+          <a:xfrm>
+            <a:off x="4902365" y="4023422"/>
+            <a:ext cx="2210498" cy="1553661"/>
+            <a:chOff x="2525087" y="859443"/>
+            <a:chExt cx="2210498" cy="1553661"/>
+          </a:xfrm>
+        </p:grpSpPr>
+        <p:cxnSp>
+          <p:nvCxnSpPr>
+            <p:cNvPr id="93" name="Straight Connector 92">
+              <a:extLst>
+                <a:ext uri="{FF2B5EF4-FFF2-40B4-BE49-F238E27FC236}">
+                  <a16:creationId xmlns:a16="http://schemas.microsoft.com/office/drawing/2014/main" id="{2BE9F9E4-7C98-98A9-45B9-7A33AA43FC5F}"/>
+                </a:ext>
+              </a:extLst>
+            </p:cNvPr>
+            <p:cNvCxnSpPr>
+              <a:cxnSpLocks/>
+            </p:cNvCxnSpPr>
+            <p:nvPr/>
+          </p:nvCxnSpPr>
+          <p:spPr>
+            <a:xfrm flipH="1">
+              <a:off x="2525087" y="1309919"/>
+              <a:ext cx="652448" cy="0"/>
+            </a:xfrm>
+            <a:prstGeom prst="line">
+              <a:avLst/>
+            </a:prstGeom>
+            <a:ln w="57150"/>
+          </p:spPr>
+          <p:style>
+            <a:lnRef idx="1">
+              <a:schemeClr val="accent1"/>
+            </a:lnRef>
+            <a:fillRef idx="0">
+              <a:schemeClr val="accent1"/>
+            </a:fillRef>
+            <a:effectRef idx="0">
+              <a:schemeClr val="accent1"/>
+            </a:effectRef>
+            <a:fontRef idx="minor">
+              <a:schemeClr val="tx1"/>
+            </a:fontRef>
+          </p:style>
+        </p:cxnSp>
+        <p:cxnSp>
+          <p:nvCxnSpPr>
+            <p:cNvPr id="94" name="Straight Connector 93">
+              <a:extLst>
+                <a:ext uri="{FF2B5EF4-FFF2-40B4-BE49-F238E27FC236}">
+                  <a16:creationId xmlns:a16="http://schemas.microsoft.com/office/drawing/2014/main" id="{54139493-22A8-CA31-501F-7B399F5F149B}"/>
+                </a:ext>
+              </a:extLst>
+            </p:cNvPr>
+            <p:cNvCxnSpPr>
+              <a:cxnSpLocks/>
+            </p:cNvCxnSpPr>
+            <p:nvPr/>
+          </p:nvCxnSpPr>
+          <p:spPr>
+            <a:xfrm flipV="1">
+              <a:off x="2552467" y="1287009"/>
+              <a:ext cx="0" cy="1123281"/>
+            </a:xfrm>
+            <a:prstGeom prst="line">
+              <a:avLst/>
+            </a:prstGeom>
+            <a:ln w="57150"/>
+          </p:spPr>
+          <p:style>
+            <a:lnRef idx="1">
+              <a:schemeClr val="accent1"/>
+            </a:lnRef>
+            <a:fillRef idx="0">
+              <a:schemeClr val="accent1"/>
+            </a:fillRef>
+            <a:effectRef idx="0">
+              <a:schemeClr val="accent1"/>
+            </a:effectRef>
+            <a:fontRef idx="minor">
+              <a:schemeClr val="tx1"/>
+            </a:fontRef>
+          </p:style>
+        </p:cxnSp>
+        <p:cxnSp>
+          <p:nvCxnSpPr>
+            <p:cNvPr id="95" name="Straight Connector 94">
+              <a:extLst>
+                <a:ext uri="{FF2B5EF4-FFF2-40B4-BE49-F238E27FC236}">
+                  <a16:creationId xmlns:a16="http://schemas.microsoft.com/office/drawing/2014/main" id="{F7B10CE1-3858-A613-B934-E499637F0804}"/>
+                </a:ext>
+              </a:extLst>
+            </p:cNvPr>
+            <p:cNvCxnSpPr>
+              <a:cxnSpLocks/>
+              <a:endCxn id="96" idx="6"/>
+            </p:cNvCxnSpPr>
+            <p:nvPr/>
+          </p:nvCxnSpPr>
+          <p:spPr>
+            <a:xfrm flipH="1">
+              <a:off x="4078488" y="1309920"/>
+              <a:ext cx="657097" cy="0"/>
+            </a:xfrm>
+            <a:prstGeom prst="line">
+              <a:avLst/>
+            </a:prstGeom>
+            <a:ln w="57150"/>
+          </p:spPr>
+          <p:style>
+            <a:lnRef idx="1">
+              <a:schemeClr val="accent1"/>
+            </a:lnRef>
+            <a:fillRef idx="0">
+              <a:schemeClr val="accent1"/>
+            </a:fillRef>
+            <a:effectRef idx="0">
+              <a:schemeClr val="accent1"/>
+            </a:effectRef>
+            <a:fontRef idx="minor">
+              <a:schemeClr val="tx1"/>
+            </a:fontRef>
+          </p:style>
+        </p:cxnSp>
+        <p:sp>
+          <p:nvSpPr>
+            <p:cNvPr id="96" name="Oval 95">
+              <a:extLst>
+                <a:ext uri="{FF2B5EF4-FFF2-40B4-BE49-F238E27FC236}">
+                  <a16:creationId xmlns:a16="http://schemas.microsoft.com/office/drawing/2014/main" id="{84F5C103-740E-CF3E-C339-604B29E52C11}"/>
+                </a:ext>
+              </a:extLst>
+            </p:cNvPr>
+            <p:cNvSpPr/>
+            <p:nvPr/>
+          </p:nvSpPr>
+          <p:spPr>
+            <a:xfrm>
+              <a:off x="3177535" y="859443"/>
+              <a:ext cx="900953" cy="900953"/>
+            </a:xfrm>
+            <a:prstGeom prst="ellipse">
+              <a:avLst/>
+            </a:prstGeom>
+            <a:noFill/>
+            <a:ln w="57150">
+              <a:solidFill>
+                <a:srgbClr val="FF0000"/>
+              </a:solidFill>
+            </a:ln>
+          </p:spPr>
+          <p:style>
+            <a:lnRef idx="2">
+              <a:schemeClr val="accent1">
+                <a:shade val="50000"/>
+              </a:schemeClr>
+            </a:lnRef>
+            <a:fillRef idx="1">
+              <a:schemeClr val="accent1"/>
+            </a:fillRef>
+            <a:effectRef idx="0">
+              <a:schemeClr val="accent1"/>
+            </a:effectRef>
+            <a:fontRef idx="minor">
+              <a:schemeClr val="lt1"/>
+            </a:fontRef>
+          </p:style>
+          <p:txBody>
+            <a:bodyPr rtlCol="0" anchor="ctr"/>
+            <a:lstStyle/>
+            <a:p>
+              <a:pPr algn="r"/>
+              <a:r>
+                <a:rPr lang="en-US" sz="3600" b="1" dirty="0">
+                  <a:solidFill>
+                    <a:schemeClr val="tx1"/>
+                  </a:solidFill>
+                </a:rPr>
+                <a:t>V</a:t>
+              </a:r>
+              <a:r>
+                <a:rPr lang="en-US" sz="3600" b="1" baseline="-25000" dirty="0">
+                  <a:solidFill>
+                    <a:schemeClr val="tx1"/>
+                  </a:solidFill>
+                </a:rPr>
+                <a:t>1</a:t>
+              </a:r>
+            </a:p>
+          </p:txBody>
+        </p:sp>
+        <p:cxnSp>
+          <p:nvCxnSpPr>
+            <p:cNvPr id="97" name="Straight Connector 96">
+              <a:extLst>
+                <a:ext uri="{FF2B5EF4-FFF2-40B4-BE49-F238E27FC236}">
+                  <a16:creationId xmlns:a16="http://schemas.microsoft.com/office/drawing/2014/main" id="{916C2B78-163A-0FEF-6D8B-902B3EA092E0}"/>
+                </a:ext>
+              </a:extLst>
+            </p:cNvPr>
+            <p:cNvCxnSpPr>
+              <a:cxnSpLocks/>
+            </p:cNvCxnSpPr>
+            <p:nvPr/>
+          </p:nvCxnSpPr>
+          <p:spPr>
+            <a:xfrm flipV="1">
+              <a:off x="4709512" y="1289823"/>
+              <a:ext cx="0" cy="1123281"/>
+            </a:xfrm>
+            <a:prstGeom prst="line">
+              <a:avLst/>
+            </a:prstGeom>
+            <a:ln w="57150"/>
+          </p:spPr>
+          <p:style>
+            <a:lnRef idx="1">
+              <a:schemeClr val="accent1"/>
+            </a:lnRef>
+            <a:fillRef idx="0">
+              <a:schemeClr val="accent1"/>
+            </a:fillRef>
+            <a:effectRef idx="0">
+              <a:schemeClr val="accent1"/>
+            </a:effectRef>
+            <a:fontRef idx="minor">
+              <a:schemeClr val="tx1"/>
+            </a:fontRef>
+          </p:style>
+        </p:cxnSp>
+      </p:grpSp>
+      <p:sp>
+        <p:nvSpPr>
+          <p:cNvPr id="30" name="Rectangle 29">
+            <a:extLst>
+              <a:ext uri="{FF2B5EF4-FFF2-40B4-BE49-F238E27FC236}">
+                <a16:creationId xmlns:a16="http://schemas.microsoft.com/office/drawing/2014/main" id="{CA615487-13D0-EBD9-1AD2-3EE7B36CBB57}"/>
+              </a:ext>
+            </a:extLst>
+          </p:cNvPr>
+          <p:cNvSpPr/>
+          <p:nvPr/>
+        </p:nvSpPr>
+        <p:spPr>
+          <a:xfrm>
+            <a:off x="185195" y="150471"/>
+            <a:ext cx="2002420" cy="721252"/>
+          </a:xfrm>
+          <a:prstGeom prst="rect">
+            <a:avLst/>
+          </a:prstGeom>
+          <a:solidFill>
+            <a:schemeClr val="bg1"/>
+          </a:solidFill>
+          <a:ln w="57150">
+            <a:solidFill>
+              <a:schemeClr val="accent6"/>
+            </a:solidFill>
+          </a:ln>
+        </p:spPr>
+        <p:style>
+          <a:lnRef idx="2">
+            <a:schemeClr val="accent1">
+              <a:shade val="50000"/>
+            </a:schemeClr>
+          </a:lnRef>
+          <a:fillRef idx="1">
+            <a:schemeClr val="accent1"/>
+          </a:fillRef>
+          <a:effectRef idx="0">
+            <a:schemeClr val="accent1"/>
+          </a:effectRef>
+          <a:fontRef idx="minor">
+            <a:schemeClr val="lt1"/>
+          </a:fontRef>
+        </p:style>
+        <p:txBody>
+          <a:bodyPr rtlCol="0" anchor="ctr"/>
+          <a:lstStyle/>
+          <a:p>
+            <a:pPr algn="ctr"/>
+            <a:r>
+              <a:rPr lang="en-US" sz="2800" b="1" dirty="0">
+                <a:solidFill>
+                  <a:schemeClr val="tx1"/>
+                </a:solidFill>
+              </a:rPr>
+              <a:t>Pātai Whā</a:t>
+            </a:r>
+          </a:p>
+        </p:txBody>
+      </p:sp>
+      <p:cxnSp>
+        <p:nvCxnSpPr>
+          <p:cNvPr id="26" name="Straight Connector 25">
+            <a:extLst>
+              <a:ext uri="{FF2B5EF4-FFF2-40B4-BE49-F238E27FC236}">
+                <a16:creationId xmlns:a16="http://schemas.microsoft.com/office/drawing/2014/main" id="{F1BCCB7E-1869-11C3-021F-48F6416900D7}"/>
+              </a:ext>
+            </a:extLst>
+          </p:cNvPr>
+          <p:cNvCxnSpPr>
+            <a:cxnSpLocks/>
+          </p:cNvCxnSpPr>
+          <p:nvPr/>
+        </p:nvCxnSpPr>
+        <p:spPr>
+          <a:xfrm flipV="1">
+            <a:off x="8321625" y="1507971"/>
+            <a:ext cx="0" cy="1938765"/>
+          </a:xfrm>
+          <a:prstGeom prst="line">
+            <a:avLst/>
+          </a:prstGeom>
+          <a:ln w="57150"/>
+        </p:spPr>
+        <p:style>
+          <a:lnRef idx="1">
+            <a:schemeClr val="accent1"/>
+          </a:lnRef>
+          <a:fillRef idx="0">
+            <a:schemeClr val="accent1"/>
+          </a:fillRef>
+          <a:effectRef idx="0">
+            <a:schemeClr val="accent1"/>
+          </a:effectRef>
+          <a:fontRef idx="minor">
+            <a:schemeClr val="tx1"/>
+          </a:fontRef>
+        </p:style>
+      </p:cxnSp>
+      <p:cxnSp>
+        <p:nvCxnSpPr>
+          <p:cNvPr id="32" name="Straight Connector 31">
+            <a:extLst>
+              <a:ext uri="{FF2B5EF4-FFF2-40B4-BE49-F238E27FC236}">
+                <a16:creationId xmlns:a16="http://schemas.microsoft.com/office/drawing/2014/main" id="{0646F0BC-493F-E91F-D64E-04B2A72330DF}"/>
+              </a:ext>
+            </a:extLst>
+          </p:cNvPr>
+          <p:cNvCxnSpPr>
+            <a:cxnSpLocks/>
+          </p:cNvCxnSpPr>
+          <p:nvPr/>
+        </p:nvCxnSpPr>
+        <p:spPr>
+          <a:xfrm flipH="1">
+            <a:off x="2509024" y="1528369"/>
+            <a:ext cx="5812601" cy="0"/>
+          </a:xfrm>
+          <a:prstGeom prst="line">
+            <a:avLst/>
+          </a:prstGeom>
+          <a:ln w="57150"/>
+        </p:spPr>
+        <p:style>
+          <a:lnRef idx="1">
+            <a:schemeClr val="accent1"/>
+          </a:lnRef>
+          <a:fillRef idx="0">
+            <a:schemeClr val="accent1"/>
+          </a:fillRef>
+          <a:effectRef idx="0">
+            <a:schemeClr val="accent1"/>
+          </a:effectRef>
+          <a:fontRef idx="minor">
+            <a:schemeClr val="tx1"/>
+          </a:fontRef>
+        </p:style>
+      </p:cxnSp>
+      <p:cxnSp>
+        <p:nvCxnSpPr>
+          <p:cNvPr id="34" name="Straight Connector 33">
+            <a:extLst>
+              <a:ext uri="{FF2B5EF4-FFF2-40B4-BE49-F238E27FC236}">
+                <a16:creationId xmlns:a16="http://schemas.microsoft.com/office/drawing/2014/main" id="{3DF8B416-C7D3-7A28-3C4B-D61C1E17DC53}"/>
+              </a:ext>
+            </a:extLst>
+          </p:cNvPr>
+          <p:cNvCxnSpPr>
+            <a:cxnSpLocks/>
+          </p:cNvCxnSpPr>
+          <p:nvPr/>
+        </p:nvCxnSpPr>
+        <p:spPr>
+          <a:xfrm flipH="1">
+            <a:off x="2540600" y="3414784"/>
+            <a:ext cx="5812601" cy="0"/>
+          </a:xfrm>
+          <a:prstGeom prst="line">
+            <a:avLst/>
+          </a:prstGeom>
+          <a:ln w="57150"/>
+        </p:spPr>
+        <p:style>
+          <a:lnRef idx="1">
+            <a:schemeClr val="accent1"/>
+          </a:lnRef>
+          <a:fillRef idx="0">
+            <a:schemeClr val="accent1"/>
+          </a:fillRef>
+          <a:effectRef idx="0">
+            <a:schemeClr val="accent1"/>
+          </a:effectRef>
+          <a:fontRef idx="minor">
+            <a:schemeClr val="tx1"/>
+          </a:fontRef>
+        </p:style>
+      </p:cxnSp>
+      <p:cxnSp>
+        <p:nvCxnSpPr>
+          <p:cNvPr id="35" name="Straight Connector 34">
+            <a:extLst>
+              <a:ext uri="{FF2B5EF4-FFF2-40B4-BE49-F238E27FC236}">
+                <a16:creationId xmlns:a16="http://schemas.microsoft.com/office/drawing/2014/main" id="{AFA93F5A-B501-49C0-FDCB-601BD06101E9}"/>
+              </a:ext>
+            </a:extLst>
+          </p:cNvPr>
+          <p:cNvCxnSpPr>
+            <a:cxnSpLocks/>
+          </p:cNvCxnSpPr>
+          <p:nvPr/>
+        </p:nvCxnSpPr>
+        <p:spPr>
+          <a:xfrm flipV="1">
+            <a:off x="2540600" y="1507970"/>
+            <a:ext cx="0" cy="1938765"/>
+          </a:xfrm>
+          <a:prstGeom prst="line">
+            <a:avLst/>
+          </a:prstGeom>
+          <a:ln w="57150"/>
+        </p:spPr>
+        <p:style>
+          <a:lnRef idx="1">
+            <a:schemeClr val="accent1"/>
+          </a:lnRef>
+          <a:fillRef idx="0">
+            <a:schemeClr val="accent1"/>
+          </a:fillRef>
+          <a:effectRef idx="0">
+            <a:schemeClr val="accent1"/>
+          </a:effectRef>
+          <a:fontRef idx="minor">
+            <a:schemeClr val="tx1"/>
+          </a:fontRef>
+        </p:style>
+      </p:cxnSp>
+      <p:cxnSp>
+        <p:nvCxnSpPr>
+          <p:cNvPr id="36" name="Straight Connector 35">
+            <a:extLst>
+              <a:ext uri="{FF2B5EF4-FFF2-40B4-BE49-F238E27FC236}">
+                <a16:creationId xmlns:a16="http://schemas.microsoft.com/office/drawing/2014/main" id="{08209E6B-B639-EC76-A650-3C1D51993BF9}"/>
+              </a:ext>
+            </a:extLst>
+          </p:cNvPr>
+          <p:cNvCxnSpPr>
+            <a:cxnSpLocks/>
+          </p:cNvCxnSpPr>
+          <p:nvPr/>
+        </p:nvCxnSpPr>
+        <p:spPr>
+          <a:xfrm flipH="1">
+            <a:off x="1803699" y="2387162"/>
+            <a:ext cx="736901" cy="0"/>
+          </a:xfrm>
+          <a:prstGeom prst="line">
+            <a:avLst/>
+          </a:prstGeom>
+          <a:ln w="57150"/>
+        </p:spPr>
+        <p:style>
+          <a:lnRef idx="1">
+            <a:schemeClr val="accent1"/>
+          </a:lnRef>
+          <a:fillRef idx="0">
+            <a:schemeClr val="accent1"/>
+          </a:fillRef>
+          <a:effectRef idx="0">
+            <a:schemeClr val="accent1"/>
+          </a:effectRef>
+          <a:fontRef idx="minor">
+            <a:schemeClr val="tx1"/>
+          </a:fontRef>
+        </p:style>
+      </p:cxnSp>
+      <p:grpSp>
+        <p:nvGrpSpPr>
+          <p:cNvPr id="6" name="Group 5">
+            <a:extLst>
+              <a:ext uri="{FF2B5EF4-FFF2-40B4-BE49-F238E27FC236}">
+                <a16:creationId xmlns:a16="http://schemas.microsoft.com/office/drawing/2014/main" id="{CD73E278-0AEE-47C1-151C-599213DEE12B}"/>
+              </a:ext>
+            </a:extLst>
+          </p:cNvPr>
+          <p:cNvGrpSpPr/>
+          <p:nvPr/>
+        </p:nvGrpSpPr>
+        <p:grpSpPr>
+          <a:xfrm>
+            <a:off x="4377323" y="119083"/>
+            <a:ext cx="2051544" cy="1733360"/>
+            <a:chOff x="7279679" y="861642"/>
+            <a:chExt cx="2210498" cy="1867661"/>
+          </a:xfrm>
+        </p:grpSpPr>
+        <p:sp>
+          <p:nvSpPr>
+            <p:cNvPr id="8" name="Rectangle 7">
+              <a:extLst>
+                <a:ext uri="{FF2B5EF4-FFF2-40B4-BE49-F238E27FC236}">
+                  <a16:creationId xmlns:a16="http://schemas.microsoft.com/office/drawing/2014/main" id="{47EACA63-6CDA-EC02-AD5C-CE26AA80491C}"/>
+                </a:ext>
+              </a:extLst>
+            </p:cNvPr>
+            <p:cNvSpPr/>
+            <p:nvPr/>
+          </p:nvSpPr>
+          <p:spPr>
+            <a:xfrm>
+              <a:off x="7464015" y="2019298"/>
+              <a:ext cx="1828800" cy="710005"/>
+            </a:xfrm>
+            <a:prstGeom prst="rect">
+              <a:avLst/>
+            </a:prstGeom>
+            <a:solidFill>
+              <a:schemeClr val="bg1"/>
+            </a:solidFill>
+            <a:ln w="57150">
+              <a:solidFill>
+                <a:schemeClr val="accent1"/>
+              </a:solidFill>
+            </a:ln>
+          </p:spPr>
+          <p:style>
+            <a:lnRef idx="2">
+              <a:schemeClr val="accent1">
+                <a:shade val="50000"/>
+              </a:schemeClr>
+            </a:lnRef>
+            <a:fillRef idx="1">
+              <a:schemeClr val="accent1"/>
+            </a:fillRef>
+            <a:effectRef idx="0">
+              <a:schemeClr val="accent1"/>
+            </a:effectRef>
+            <a:fontRef idx="minor">
+              <a:schemeClr val="lt1"/>
+            </a:fontRef>
+          </p:style>
+          <p:txBody>
+            <a:bodyPr rtlCol="0" anchor="ctr"/>
+            <a:lstStyle/>
+            <a:p>
+              <a:pPr algn="ctr"/>
+              <a:r>
+                <a:rPr lang="en-US" sz="3600" b="1" dirty="0">
+                  <a:solidFill>
+                    <a:schemeClr val="tx1"/>
+                  </a:solidFill>
+                </a:rPr>
+                <a:t>820Ω</a:t>
+              </a:r>
+            </a:p>
+          </p:txBody>
+        </p:sp>
+        <p:grpSp>
+          <p:nvGrpSpPr>
+            <p:cNvPr id="10" name="Group 9">
+              <a:extLst>
+                <a:ext uri="{FF2B5EF4-FFF2-40B4-BE49-F238E27FC236}">
+                  <a16:creationId xmlns:a16="http://schemas.microsoft.com/office/drawing/2014/main" id="{627629DB-9922-79C8-096A-DD5FDD328237}"/>
+                </a:ext>
+              </a:extLst>
+            </p:cNvPr>
+            <p:cNvGrpSpPr/>
+            <p:nvPr/>
+          </p:nvGrpSpPr>
+          <p:grpSpPr>
+            <a:xfrm>
+              <a:off x="7279679" y="861642"/>
+              <a:ext cx="2210498" cy="1553661"/>
+              <a:chOff x="2525087" y="859443"/>
+              <a:chExt cx="2210498" cy="1553661"/>
+            </a:xfrm>
+          </p:grpSpPr>
+          <p:cxnSp>
+            <p:nvCxnSpPr>
+              <p:cNvPr id="11" name="Straight Connector 10">
+                <a:extLst>
+                  <a:ext uri="{FF2B5EF4-FFF2-40B4-BE49-F238E27FC236}">
+                    <a16:creationId xmlns:a16="http://schemas.microsoft.com/office/drawing/2014/main" id="{7C3DFCC1-7230-D5C0-9868-27CDE6598AF7}"/>
+                  </a:ext>
+                </a:extLst>
+              </p:cNvPr>
+              <p:cNvCxnSpPr>
+                <a:cxnSpLocks/>
+              </p:cNvCxnSpPr>
+              <p:nvPr/>
+            </p:nvCxnSpPr>
+            <p:spPr>
+              <a:xfrm flipH="1">
+                <a:off x="2525087" y="1309919"/>
+                <a:ext cx="652448" cy="0"/>
+              </a:xfrm>
+              <a:prstGeom prst="line">
+                <a:avLst/>
+              </a:prstGeom>
+              <a:ln w="57150"/>
+            </p:spPr>
+            <p:style>
+              <a:lnRef idx="1">
+                <a:schemeClr val="accent1"/>
+              </a:lnRef>
+              <a:fillRef idx="0">
+                <a:schemeClr val="accent1"/>
+              </a:fillRef>
+              <a:effectRef idx="0">
+                <a:schemeClr val="accent1"/>
+              </a:effectRef>
+              <a:fontRef idx="minor">
+                <a:schemeClr val="tx1"/>
+              </a:fontRef>
+            </p:style>
+          </p:cxnSp>
+          <p:cxnSp>
+            <p:nvCxnSpPr>
+              <p:cNvPr id="14" name="Straight Connector 13">
+                <a:extLst>
+                  <a:ext uri="{FF2B5EF4-FFF2-40B4-BE49-F238E27FC236}">
+                    <a16:creationId xmlns:a16="http://schemas.microsoft.com/office/drawing/2014/main" id="{5F62B849-FDC9-A14B-AD02-A6F1D68CE798}"/>
+                  </a:ext>
+                </a:extLst>
+              </p:cNvPr>
+              <p:cNvCxnSpPr>
+                <a:cxnSpLocks/>
+              </p:cNvCxnSpPr>
+              <p:nvPr/>
+            </p:nvCxnSpPr>
+            <p:spPr>
+              <a:xfrm flipV="1">
+                <a:off x="2552467" y="1287009"/>
+                <a:ext cx="0" cy="1123281"/>
+              </a:xfrm>
+              <a:prstGeom prst="line">
+                <a:avLst/>
+              </a:prstGeom>
+              <a:ln w="57150"/>
+            </p:spPr>
+            <p:style>
+              <a:lnRef idx="1">
+                <a:schemeClr val="accent1"/>
+              </a:lnRef>
+              <a:fillRef idx="0">
+                <a:schemeClr val="accent1"/>
+              </a:fillRef>
+              <a:effectRef idx="0">
+                <a:schemeClr val="accent1"/>
+              </a:effectRef>
+              <a:fontRef idx="minor">
+                <a:schemeClr val="tx1"/>
+              </a:fontRef>
+            </p:style>
+          </p:cxnSp>
+          <p:cxnSp>
+            <p:nvCxnSpPr>
+              <p:cNvPr id="16" name="Straight Connector 15">
+                <a:extLst>
+                  <a:ext uri="{FF2B5EF4-FFF2-40B4-BE49-F238E27FC236}">
+                    <a16:creationId xmlns:a16="http://schemas.microsoft.com/office/drawing/2014/main" id="{508883C1-7728-BDB3-20F5-6F19931C9669}"/>
+                  </a:ext>
+                </a:extLst>
+              </p:cNvPr>
+              <p:cNvCxnSpPr>
+                <a:cxnSpLocks/>
+                <a:endCxn id="17" idx="6"/>
+              </p:cNvCxnSpPr>
+              <p:nvPr/>
+            </p:nvCxnSpPr>
+            <p:spPr>
+              <a:xfrm flipH="1">
+                <a:off x="4078488" y="1309920"/>
+                <a:ext cx="657097" cy="0"/>
+              </a:xfrm>
+              <a:prstGeom prst="line">
+                <a:avLst/>
+              </a:prstGeom>
+              <a:ln w="57150"/>
+            </p:spPr>
+            <p:style>
+              <a:lnRef idx="1">
+                <a:schemeClr val="accent1"/>
+              </a:lnRef>
+              <a:fillRef idx="0">
+                <a:schemeClr val="accent1"/>
+              </a:fillRef>
+              <a:effectRef idx="0">
+                <a:schemeClr val="accent1"/>
+              </a:effectRef>
+              <a:fontRef idx="minor">
+                <a:schemeClr val="tx1"/>
+              </a:fontRef>
+            </p:style>
+          </p:cxnSp>
+          <p:sp>
+            <p:nvSpPr>
+              <p:cNvPr id="17" name="Oval 16">
+                <a:extLst>
+                  <a:ext uri="{FF2B5EF4-FFF2-40B4-BE49-F238E27FC236}">
+                    <a16:creationId xmlns:a16="http://schemas.microsoft.com/office/drawing/2014/main" id="{81F67E9E-F2B8-BCE2-12E0-0EBCBA9044CC}"/>
+                  </a:ext>
+                </a:extLst>
+              </p:cNvPr>
+              <p:cNvSpPr/>
+              <p:nvPr/>
+            </p:nvSpPr>
+            <p:spPr>
+              <a:xfrm>
+                <a:off x="3177535" y="859443"/>
+                <a:ext cx="900953" cy="900953"/>
+              </a:xfrm>
+              <a:prstGeom prst="ellipse">
+                <a:avLst/>
+              </a:prstGeom>
+              <a:noFill/>
+              <a:ln w="57150">
+                <a:solidFill>
+                  <a:srgbClr val="FF0000"/>
+                </a:solidFill>
+              </a:ln>
+            </p:spPr>
+            <p:style>
+              <a:lnRef idx="2">
+                <a:schemeClr val="accent1">
+                  <a:shade val="50000"/>
+                </a:schemeClr>
+              </a:lnRef>
+              <a:fillRef idx="1">
+                <a:schemeClr val="accent1"/>
+              </a:fillRef>
+              <a:effectRef idx="0">
+                <a:schemeClr val="accent1"/>
+              </a:effectRef>
+              <a:fontRef idx="minor">
+                <a:schemeClr val="lt1"/>
+              </a:fontRef>
+            </p:style>
+            <p:txBody>
+              <a:bodyPr rtlCol="0" anchor="ctr"/>
+              <a:lstStyle/>
+              <a:p>
+                <a:pPr algn="r"/>
+                <a:r>
+                  <a:rPr lang="en-US" sz="2800" b="1" dirty="0">
+                    <a:solidFill>
+                      <a:schemeClr val="tx1"/>
+                    </a:solidFill>
+                  </a:rPr>
+                  <a:t>V</a:t>
+                </a:r>
+                <a:r>
+                  <a:rPr lang="en-US" sz="2800" b="1" baseline="-25000" dirty="0">
+                    <a:solidFill>
+                      <a:schemeClr val="tx1"/>
+                    </a:solidFill>
+                  </a:rPr>
+                  <a:t>3</a:t>
+                </a:r>
+                <a:endParaRPr lang="en-US" sz="3600" b="1" baseline="-25000" dirty="0">
+                  <a:solidFill>
+                    <a:schemeClr val="tx1"/>
+                  </a:solidFill>
+                </a:endParaRPr>
+              </a:p>
+            </p:txBody>
+          </p:sp>
+          <p:cxnSp>
+            <p:nvCxnSpPr>
+              <p:cNvPr id="19" name="Straight Connector 18">
+                <a:extLst>
+                  <a:ext uri="{FF2B5EF4-FFF2-40B4-BE49-F238E27FC236}">
+                    <a16:creationId xmlns:a16="http://schemas.microsoft.com/office/drawing/2014/main" id="{52B487EB-3DCA-362E-9AC3-35246113BC4C}"/>
+                  </a:ext>
+                </a:extLst>
+              </p:cNvPr>
+              <p:cNvCxnSpPr>
+                <a:cxnSpLocks/>
+              </p:cNvCxnSpPr>
+              <p:nvPr/>
+            </p:nvCxnSpPr>
+            <p:spPr>
+              <a:xfrm flipV="1">
+                <a:off x="4709512" y="1289823"/>
+                <a:ext cx="0" cy="1123281"/>
+              </a:xfrm>
+              <a:prstGeom prst="line">
+                <a:avLst/>
+              </a:prstGeom>
+              <a:ln w="57150"/>
+            </p:spPr>
+            <p:style>
+              <a:lnRef idx="1">
+                <a:schemeClr val="accent1"/>
+              </a:lnRef>
+              <a:fillRef idx="0">
+                <a:schemeClr val="accent1"/>
+              </a:fillRef>
+              <a:effectRef idx="0">
+                <a:schemeClr val="accent1"/>
+              </a:effectRef>
+              <a:fontRef idx="minor">
+                <a:schemeClr val="tx1"/>
+              </a:fontRef>
+            </p:style>
+          </p:cxnSp>
+        </p:grpSp>
+      </p:grpSp>
+      <p:grpSp>
+        <p:nvGrpSpPr>
+          <p:cNvPr id="4" name="Group 3">
+            <a:extLst>
+              <a:ext uri="{FF2B5EF4-FFF2-40B4-BE49-F238E27FC236}">
+                <a16:creationId xmlns:a16="http://schemas.microsoft.com/office/drawing/2014/main" id="{27F414C3-7D5D-701C-75B1-3F8FFC928CCC}"/>
+              </a:ext>
+            </a:extLst>
+          </p:cNvPr>
+          <p:cNvGrpSpPr/>
+          <p:nvPr/>
+        </p:nvGrpSpPr>
+        <p:grpSpPr>
+          <a:xfrm>
+            <a:off x="2828298" y="1968854"/>
+            <a:ext cx="2047711" cy="1725101"/>
+            <a:chOff x="2525087" y="859443"/>
+            <a:chExt cx="2210498" cy="1862241"/>
+          </a:xfrm>
+        </p:grpSpPr>
+        <p:sp>
+          <p:nvSpPr>
+            <p:cNvPr id="18" name="Rectangle 17">
+              <a:extLst>
+                <a:ext uri="{FF2B5EF4-FFF2-40B4-BE49-F238E27FC236}">
+                  <a16:creationId xmlns:a16="http://schemas.microsoft.com/office/drawing/2014/main" id="{BFA42A12-957F-038B-2DB4-74E6EABA5EBF}"/>
+                </a:ext>
+              </a:extLst>
+            </p:cNvPr>
+            <p:cNvSpPr/>
+            <p:nvPr/>
+          </p:nvSpPr>
+          <p:spPr>
+            <a:xfrm>
+              <a:off x="2727063" y="2011679"/>
+              <a:ext cx="1828800" cy="710005"/>
+            </a:xfrm>
+            <a:prstGeom prst="rect">
+              <a:avLst/>
+            </a:prstGeom>
+            <a:solidFill>
+              <a:schemeClr val="bg1"/>
+            </a:solidFill>
+            <a:ln w="57150">
+              <a:solidFill>
+                <a:schemeClr val="accent1"/>
+              </a:solidFill>
+            </a:ln>
+          </p:spPr>
+          <p:style>
+            <a:lnRef idx="2">
+              <a:schemeClr val="accent1">
+                <a:shade val="50000"/>
+              </a:schemeClr>
+            </a:lnRef>
+            <a:fillRef idx="1">
+              <a:schemeClr val="accent1"/>
+            </a:fillRef>
+            <a:effectRef idx="0">
+              <a:schemeClr val="accent1"/>
+            </a:effectRef>
+            <a:fontRef idx="minor">
+              <a:schemeClr val="lt1"/>
+            </a:fontRef>
+          </p:style>
+          <p:txBody>
+            <a:bodyPr rtlCol="0" anchor="ctr"/>
+            <a:lstStyle/>
+            <a:p>
+              <a:pPr algn="ctr"/>
+              <a:r>
+                <a:rPr lang="en-US" sz="3600" b="1" dirty="0">
+                  <a:solidFill>
+                    <a:schemeClr val="tx1"/>
+                  </a:solidFill>
+                </a:rPr>
+                <a:t>1000Ω</a:t>
+              </a:r>
+            </a:p>
+          </p:txBody>
+        </p:sp>
+        <p:grpSp>
+          <p:nvGrpSpPr>
+            <p:cNvPr id="27" name="Group 26">
+              <a:extLst>
+                <a:ext uri="{FF2B5EF4-FFF2-40B4-BE49-F238E27FC236}">
+                  <a16:creationId xmlns:a16="http://schemas.microsoft.com/office/drawing/2014/main" id="{75F6DB18-3F89-AAC9-38EC-105B6C23F271}"/>
+                </a:ext>
+              </a:extLst>
+            </p:cNvPr>
+            <p:cNvGrpSpPr/>
+            <p:nvPr/>
+          </p:nvGrpSpPr>
+          <p:grpSpPr>
+            <a:xfrm>
+              <a:off x="2525087" y="859443"/>
+              <a:ext cx="2210498" cy="1553661"/>
+              <a:chOff x="2525087" y="859443"/>
+              <a:chExt cx="2210498" cy="1553661"/>
+            </a:xfrm>
+          </p:grpSpPr>
+          <p:cxnSp>
+            <p:nvCxnSpPr>
+              <p:cNvPr id="38" name="Straight Connector 37">
+                <a:extLst>
+                  <a:ext uri="{FF2B5EF4-FFF2-40B4-BE49-F238E27FC236}">
+                    <a16:creationId xmlns:a16="http://schemas.microsoft.com/office/drawing/2014/main" id="{5D2583AA-F3B1-68D6-0A55-49FFF628EBCB}"/>
+                  </a:ext>
+                </a:extLst>
+              </p:cNvPr>
+              <p:cNvCxnSpPr>
+                <a:cxnSpLocks/>
+              </p:cNvCxnSpPr>
+              <p:nvPr/>
+            </p:nvCxnSpPr>
+            <p:spPr>
+              <a:xfrm flipH="1">
+                <a:off x="2525087" y="1309919"/>
+                <a:ext cx="652448" cy="0"/>
+              </a:xfrm>
+              <a:prstGeom prst="line">
+                <a:avLst/>
+              </a:prstGeom>
+              <a:ln w="57150"/>
+            </p:spPr>
+            <p:style>
+              <a:lnRef idx="1">
+                <a:schemeClr val="accent1"/>
+              </a:lnRef>
+              <a:fillRef idx="0">
+                <a:schemeClr val="accent1"/>
+              </a:fillRef>
+              <a:effectRef idx="0">
+                <a:schemeClr val="accent1"/>
+              </a:effectRef>
+              <a:fontRef idx="minor">
+                <a:schemeClr val="tx1"/>
+              </a:fontRef>
+            </p:style>
+          </p:cxnSp>
+          <p:cxnSp>
+            <p:nvCxnSpPr>
+              <p:cNvPr id="39" name="Straight Connector 38">
+                <a:extLst>
+                  <a:ext uri="{FF2B5EF4-FFF2-40B4-BE49-F238E27FC236}">
+                    <a16:creationId xmlns:a16="http://schemas.microsoft.com/office/drawing/2014/main" id="{ADD32EA3-B831-340A-DEA7-DA92A461D32B}"/>
+                  </a:ext>
+                </a:extLst>
+              </p:cNvPr>
+              <p:cNvCxnSpPr>
+                <a:cxnSpLocks/>
+              </p:cNvCxnSpPr>
+              <p:nvPr/>
+            </p:nvCxnSpPr>
+            <p:spPr>
+              <a:xfrm flipV="1">
+                <a:off x="2552467" y="1287009"/>
+                <a:ext cx="0" cy="1123281"/>
+              </a:xfrm>
+              <a:prstGeom prst="line">
+                <a:avLst/>
+              </a:prstGeom>
+              <a:ln w="57150"/>
+            </p:spPr>
+            <p:style>
+              <a:lnRef idx="1">
+                <a:schemeClr val="accent1"/>
+              </a:lnRef>
+              <a:fillRef idx="0">
+                <a:schemeClr val="accent1"/>
+              </a:fillRef>
+              <a:effectRef idx="0">
+                <a:schemeClr val="accent1"/>
+              </a:effectRef>
+              <a:fontRef idx="minor">
+                <a:schemeClr val="tx1"/>
+              </a:fontRef>
+            </p:style>
+          </p:cxnSp>
+          <p:cxnSp>
+            <p:nvCxnSpPr>
+              <p:cNvPr id="43" name="Straight Connector 42">
+                <a:extLst>
+                  <a:ext uri="{FF2B5EF4-FFF2-40B4-BE49-F238E27FC236}">
+                    <a16:creationId xmlns:a16="http://schemas.microsoft.com/office/drawing/2014/main" id="{6E1C6266-FDF7-104D-4F71-D77ABE445B04}"/>
+                  </a:ext>
+                </a:extLst>
+              </p:cNvPr>
+              <p:cNvCxnSpPr>
+                <a:cxnSpLocks/>
+                <a:endCxn id="37" idx="6"/>
+              </p:cNvCxnSpPr>
+              <p:nvPr/>
+            </p:nvCxnSpPr>
+            <p:spPr>
+              <a:xfrm flipH="1">
+                <a:off x="4078488" y="1309920"/>
+                <a:ext cx="657097" cy="0"/>
+              </a:xfrm>
+              <a:prstGeom prst="line">
+                <a:avLst/>
+              </a:prstGeom>
+              <a:ln w="57150"/>
+            </p:spPr>
+            <p:style>
+              <a:lnRef idx="1">
+                <a:schemeClr val="accent1"/>
+              </a:lnRef>
+              <a:fillRef idx="0">
+                <a:schemeClr val="accent1"/>
+              </a:fillRef>
+              <a:effectRef idx="0">
+                <a:schemeClr val="accent1"/>
+              </a:effectRef>
+              <a:fontRef idx="minor">
+                <a:schemeClr val="tx1"/>
+              </a:fontRef>
+            </p:style>
+          </p:cxnSp>
+          <p:sp>
+            <p:nvSpPr>
+              <p:cNvPr id="37" name="Oval 36">
+                <a:extLst>
+                  <a:ext uri="{FF2B5EF4-FFF2-40B4-BE49-F238E27FC236}">
+                    <a16:creationId xmlns:a16="http://schemas.microsoft.com/office/drawing/2014/main" id="{C501AFBE-159F-EA31-1122-6E055778148A}"/>
+                  </a:ext>
+                </a:extLst>
+              </p:cNvPr>
+              <p:cNvSpPr/>
+              <p:nvPr/>
+            </p:nvSpPr>
+            <p:spPr>
+              <a:xfrm>
+                <a:off x="3177535" y="859443"/>
+                <a:ext cx="900953" cy="900953"/>
+              </a:xfrm>
+              <a:prstGeom prst="ellipse">
+                <a:avLst/>
+              </a:prstGeom>
+              <a:noFill/>
+              <a:ln w="57150">
+                <a:solidFill>
+                  <a:srgbClr val="FF0000"/>
+                </a:solidFill>
+              </a:ln>
+            </p:spPr>
+            <p:style>
+              <a:lnRef idx="2">
+                <a:schemeClr val="accent1">
+                  <a:shade val="50000"/>
+                </a:schemeClr>
+              </a:lnRef>
+              <a:fillRef idx="1">
+                <a:schemeClr val="accent1"/>
+              </a:fillRef>
+              <a:effectRef idx="0">
+                <a:schemeClr val="accent1"/>
+              </a:effectRef>
+              <a:fontRef idx="minor">
+                <a:schemeClr val="lt1"/>
+              </a:fontRef>
+            </p:style>
+            <p:txBody>
+              <a:bodyPr rtlCol="0" anchor="ctr"/>
+              <a:lstStyle/>
+              <a:p>
+                <a:pPr algn="r"/>
+                <a:r>
+                  <a:rPr lang="en-US" sz="2800" b="1" dirty="0">
+                    <a:solidFill>
+                      <a:schemeClr val="tx1"/>
+                    </a:solidFill>
+                  </a:rPr>
+                  <a:t>V</a:t>
+                </a:r>
+                <a:r>
+                  <a:rPr lang="en-US" sz="2800" b="1" baseline="-25000" dirty="0">
+                    <a:solidFill>
+                      <a:schemeClr val="tx1"/>
+                    </a:solidFill>
+                  </a:rPr>
+                  <a:t>5</a:t>
+                </a:r>
+              </a:p>
+            </p:txBody>
+          </p:sp>
+          <p:cxnSp>
+            <p:nvCxnSpPr>
+              <p:cNvPr id="64" name="Straight Connector 63">
+                <a:extLst>
+                  <a:ext uri="{FF2B5EF4-FFF2-40B4-BE49-F238E27FC236}">
+                    <a16:creationId xmlns:a16="http://schemas.microsoft.com/office/drawing/2014/main" id="{A38FC4C4-0289-D0D6-61BF-2A5558BEA287}"/>
+                  </a:ext>
+                </a:extLst>
+              </p:cNvPr>
+              <p:cNvCxnSpPr>
+                <a:cxnSpLocks/>
+              </p:cNvCxnSpPr>
+              <p:nvPr/>
+            </p:nvCxnSpPr>
+            <p:spPr>
+              <a:xfrm flipV="1">
+                <a:off x="4709512" y="1289823"/>
+                <a:ext cx="0" cy="1123281"/>
+              </a:xfrm>
+              <a:prstGeom prst="line">
+                <a:avLst/>
+              </a:prstGeom>
+              <a:ln w="57150"/>
+            </p:spPr>
+            <p:style>
+              <a:lnRef idx="1">
+                <a:schemeClr val="accent1"/>
+              </a:lnRef>
+              <a:fillRef idx="0">
+                <a:schemeClr val="accent1"/>
+              </a:fillRef>
+              <a:effectRef idx="0">
+                <a:schemeClr val="accent1"/>
+              </a:effectRef>
+              <a:fontRef idx="minor">
+                <a:schemeClr val="tx1"/>
+              </a:fontRef>
+            </p:style>
+          </p:cxnSp>
+        </p:grpSp>
+      </p:grpSp>
+      <p:grpSp>
+        <p:nvGrpSpPr>
+          <p:cNvPr id="3" name="Group 2">
+            <a:extLst>
+              <a:ext uri="{FF2B5EF4-FFF2-40B4-BE49-F238E27FC236}">
+                <a16:creationId xmlns:a16="http://schemas.microsoft.com/office/drawing/2014/main" id="{6DDF12EE-00D9-A2E2-0666-4D8167A9EDF4}"/>
+              </a:ext>
+            </a:extLst>
+          </p:cNvPr>
+          <p:cNvGrpSpPr/>
+          <p:nvPr/>
+        </p:nvGrpSpPr>
+        <p:grpSpPr>
+          <a:xfrm>
+            <a:off x="5101906" y="1977847"/>
+            <a:ext cx="2075811" cy="1737242"/>
+            <a:chOff x="4904690" y="871723"/>
+            <a:chExt cx="2210498" cy="1849961"/>
+          </a:xfrm>
+        </p:grpSpPr>
+        <p:sp>
+          <p:nvSpPr>
+            <p:cNvPr id="20" name="Rectangle 19">
+              <a:extLst>
+                <a:ext uri="{FF2B5EF4-FFF2-40B4-BE49-F238E27FC236}">
+                  <a16:creationId xmlns:a16="http://schemas.microsoft.com/office/drawing/2014/main" id="{400983C0-DD83-9C97-CE26-5AA6A392FB2F}"/>
+                </a:ext>
+              </a:extLst>
+            </p:cNvPr>
+            <p:cNvSpPr/>
+            <p:nvPr/>
+          </p:nvSpPr>
+          <p:spPr>
+            <a:xfrm>
+              <a:off x="5095539" y="2011679"/>
+              <a:ext cx="1828800" cy="710005"/>
+            </a:xfrm>
+            <a:prstGeom prst="rect">
+              <a:avLst/>
+            </a:prstGeom>
+            <a:solidFill>
+              <a:schemeClr val="bg1"/>
+            </a:solidFill>
+            <a:ln w="57150">
+              <a:solidFill>
+                <a:schemeClr val="accent1"/>
+              </a:solidFill>
+            </a:ln>
+          </p:spPr>
+          <p:style>
+            <a:lnRef idx="2">
+              <a:schemeClr val="accent1">
+                <a:shade val="50000"/>
+              </a:schemeClr>
+            </a:lnRef>
+            <a:fillRef idx="1">
+              <a:schemeClr val="accent1"/>
+            </a:fillRef>
+            <a:effectRef idx="0">
+              <a:schemeClr val="accent1"/>
+            </a:effectRef>
+            <a:fontRef idx="minor">
+              <a:schemeClr val="lt1"/>
+            </a:fontRef>
+          </p:style>
+          <p:txBody>
+            <a:bodyPr rtlCol="0" anchor="ctr"/>
+            <a:lstStyle/>
+            <a:p>
+              <a:pPr algn="ctr"/>
+              <a:r>
+                <a:rPr lang="en-US" sz="3600" b="1" dirty="0">
+                  <a:solidFill>
+                    <a:schemeClr val="tx1"/>
+                  </a:solidFill>
+                </a:rPr>
+                <a:t>1000Ω</a:t>
+              </a:r>
+            </a:p>
+          </p:txBody>
+        </p:sp>
+        <p:grpSp>
+          <p:nvGrpSpPr>
+            <p:cNvPr id="77" name="Group 76">
+              <a:extLst>
+                <a:ext uri="{FF2B5EF4-FFF2-40B4-BE49-F238E27FC236}">
+                  <a16:creationId xmlns:a16="http://schemas.microsoft.com/office/drawing/2014/main" id="{3F20FB1E-0C12-95A0-B9D2-2928A4857C6A}"/>
+                </a:ext>
+              </a:extLst>
+            </p:cNvPr>
+            <p:cNvGrpSpPr/>
+            <p:nvPr/>
+          </p:nvGrpSpPr>
+          <p:grpSpPr>
+            <a:xfrm>
+              <a:off x="4904690" y="871723"/>
+              <a:ext cx="2210498" cy="1553661"/>
+              <a:chOff x="2525087" y="859443"/>
+              <a:chExt cx="2210498" cy="1553661"/>
+            </a:xfrm>
+          </p:grpSpPr>
+          <p:cxnSp>
+            <p:nvCxnSpPr>
+              <p:cNvPr id="78" name="Straight Connector 77">
+                <a:extLst>
+                  <a:ext uri="{FF2B5EF4-FFF2-40B4-BE49-F238E27FC236}">
+                    <a16:creationId xmlns:a16="http://schemas.microsoft.com/office/drawing/2014/main" id="{76DB11F2-4392-D84C-23F2-3A03DC63C288}"/>
+                  </a:ext>
+                </a:extLst>
+              </p:cNvPr>
+              <p:cNvCxnSpPr>
+                <a:cxnSpLocks/>
+              </p:cNvCxnSpPr>
+              <p:nvPr/>
+            </p:nvCxnSpPr>
+            <p:spPr>
+              <a:xfrm flipH="1">
+                <a:off x="2525087" y="1309919"/>
+                <a:ext cx="652448" cy="0"/>
+              </a:xfrm>
+              <a:prstGeom prst="line">
+                <a:avLst/>
+              </a:prstGeom>
+              <a:ln w="57150"/>
+            </p:spPr>
+            <p:style>
+              <a:lnRef idx="1">
+                <a:schemeClr val="accent1"/>
+              </a:lnRef>
+              <a:fillRef idx="0">
+                <a:schemeClr val="accent1"/>
+              </a:fillRef>
+              <a:effectRef idx="0">
+                <a:schemeClr val="accent1"/>
+              </a:effectRef>
+              <a:fontRef idx="minor">
+                <a:schemeClr val="tx1"/>
+              </a:fontRef>
+            </p:style>
+          </p:cxnSp>
+          <p:cxnSp>
+            <p:nvCxnSpPr>
+              <p:cNvPr id="79" name="Straight Connector 78">
+                <a:extLst>
+                  <a:ext uri="{FF2B5EF4-FFF2-40B4-BE49-F238E27FC236}">
+                    <a16:creationId xmlns:a16="http://schemas.microsoft.com/office/drawing/2014/main" id="{C8B4EA21-E0E8-9E7B-95BD-27225747F87D}"/>
+                  </a:ext>
+                </a:extLst>
+              </p:cNvPr>
+              <p:cNvCxnSpPr>
+                <a:cxnSpLocks/>
+              </p:cNvCxnSpPr>
+              <p:nvPr/>
+            </p:nvCxnSpPr>
+            <p:spPr>
+              <a:xfrm flipV="1">
+                <a:off x="2552467" y="1287009"/>
+                <a:ext cx="0" cy="1123281"/>
+              </a:xfrm>
+              <a:prstGeom prst="line">
+                <a:avLst/>
+              </a:prstGeom>
+              <a:ln w="57150"/>
+            </p:spPr>
+            <p:style>
+              <a:lnRef idx="1">
+                <a:schemeClr val="accent1"/>
+              </a:lnRef>
+              <a:fillRef idx="0">
+                <a:schemeClr val="accent1"/>
+              </a:fillRef>
+              <a:effectRef idx="0">
+                <a:schemeClr val="accent1"/>
+              </a:effectRef>
+              <a:fontRef idx="minor">
+                <a:schemeClr val="tx1"/>
+              </a:fontRef>
+            </p:style>
+          </p:cxnSp>
+          <p:cxnSp>
+            <p:nvCxnSpPr>
+              <p:cNvPr id="80" name="Straight Connector 79">
+                <a:extLst>
+                  <a:ext uri="{FF2B5EF4-FFF2-40B4-BE49-F238E27FC236}">
+                    <a16:creationId xmlns:a16="http://schemas.microsoft.com/office/drawing/2014/main" id="{A86065A6-2665-93F0-516D-AE95C9DD266E}"/>
+                  </a:ext>
+                </a:extLst>
+              </p:cNvPr>
+              <p:cNvCxnSpPr>
+                <a:cxnSpLocks/>
+                <a:endCxn id="82" idx="6"/>
+              </p:cNvCxnSpPr>
+              <p:nvPr/>
+            </p:nvCxnSpPr>
+            <p:spPr>
+              <a:xfrm flipH="1">
+                <a:off x="4078488" y="1309920"/>
+                <a:ext cx="657097" cy="0"/>
+              </a:xfrm>
+              <a:prstGeom prst="line">
+                <a:avLst/>
+              </a:prstGeom>
+              <a:ln w="57150"/>
+            </p:spPr>
+            <p:style>
+              <a:lnRef idx="1">
+                <a:schemeClr val="accent1"/>
+              </a:lnRef>
+              <a:fillRef idx="0">
+                <a:schemeClr val="accent1"/>
+              </a:fillRef>
+              <a:effectRef idx="0">
+                <a:schemeClr val="accent1"/>
+              </a:effectRef>
+              <a:fontRef idx="minor">
+                <a:schemeClr val="tx1"/>
+              </a:fontRef>
+            </p:style>
+          </p:cxnSp>
+          <p:sp>
+            <p:nvSpPr>
+              <p:cNvPr id="82" name="Oval 81">
+                <a:extLst>
+                  <a:ext uri="{FF2B5EF4-FFF2-40B4-BE49-F238E27FC236}">
+                    <a16:creationId xmlns:a16="http://schemas.microsoft.com/office/drawing/2014/main" id="{E20A80CB-DC75-85D6-399D-494442E92DC0}"/>
+                  </a:ext>
+                </a:extLst>
+              </p:cNvPr>
+              <p:cNvSpPr/>
+              <p:nvPr/>
+            </p:nvSpPr>
+            <p:spPr>
+              <a:xfrm>
+                <a:off x="3177535" y="859443"/>
+                <a:ext cx="900953" cy="900953"/>
+              </a:xfrm>
+              <a:prstGeom prst="ellipse">
+                <a:avLst/>
+              </a:prstGeom>
+              <a:noFill/>
+              <a:ln w="57150">
+                <a:solidFill>
+                  <a:srgbClr val="FF0000"/>
+                </a:solidFill>
+              </a:ln>
+            </p:spPr>
+            <p:style>
+              <a:lnRef idx="2">
+                <a:schemeClr val="accent1">
+                  <a:shade val="50000"/>
+                </a:schemeClr>
+              </a:lnRef>
+              <a:fillRef idx="1">
+                <a:schemeClr val="accent1"/>
+              </a:fillRef>
+              <a:effectRef idx="0">
+                <a:schemeClr val="accent1"/>
+              </a:effectRef>
+              <a:fontRef idx="minor">
+                <a:schemeClr val="lt1"/>
+              </a:fontRef>
+            </p:style>
+            <p:txBody>
+              <a:bodyPr rtlCol="0" anchor="ctr"/>
+              <a:lstStyle/>
+              <a:p>
+                <a:pPr algn="r"/>
+                <a:r>
+                  <a:rPr lang="en-US" sz="2800" b="1" dirty="0">
+                    <a:solidFill>
+                      <a:schemeClr val="tx1"/>
+                    </a:solidFill>
+                  </a:rPr>
+                  <a:t>V</a:t>
+                </a:r>
+                <a:r>
+                  <a:rPr lang="en-US" sz="2800" b="1" baseline="-25000" dirty="0">
+                    <a:solidFill>
+                      <a:schemeClr val="tx1"/>
+                    </a:solidFill>
+                  </a:rPr>
+                  <a:t>4</a:t>
+                </a:r>
+              </a:p>
+            </p:txBody>
+          </p:sp>
+          <p:cxnSp>
+            <p:nvCxnSpPr>
+              <p:cNvPr id="83" name="Straight Connector 82">
+                <a:extLst>
+                  <a:ext uri="{FF2B5EF4-FFF2-40B4-BE49-F238E27FC236}">
+                    <a16:creationId xmlns:a16="http://schemas.microsoft.com/office/drawing/2014/main" id="{F4FC66FC-D0D3-ECE6-128C-C710A94218A1}"/>
+                  </a:ext>
+                </a:extLst>
+              </p:cNvPr>
+              <p:cNvCxnSpPr>
+                <a:cxnSpLocks/>
+              </p:cNvCxnSpPr>
+              <p:nvPr/>
+            </p:nvCxnSpPr>
+            <p:spPr>
+              <a:xfrm flipV="1">
+                <a:off x="4709512" y="1289823"/>
+                <a:ext cx="0" cy="1123281"/>
+              </a:xfrm>
+              <a:prstGeom prst="line">
+                <a:avLst/>
+              </a:prstGeom>
+              <a:ln w="57150"/>
+            </p:spPr>
+            <p:style>
+              <a:lnRef idx="1">
+                <a:schemeClr val="accent1"/>
+              </a:lnRef>
+              <a:fillRef idx="0">
+                <a:schemeClr val="accent1"/>
+              </a:fillRef>
+              <a:effectRef idx="0">
+                <a:schemeClr val="accent1"/>
+              </a:effectRef>
+              <a:fontRef idx="minor">
+                <a:schemeClr val="tx1"/>
+              </a:fontRef>
+            </p:style>
+          </p:cxnSp>
+        </p:grpSp>
+      </p:grpSp>
+      <p:sp>
+        <p:nvSpPr>
+          <p:cNvPr id="22" name="Oval 21">
+            <a:extLst>
+              <a:ext uri="{FF2B5EF4-FFF2-40B4-BE49-F238E27FC236}">
+                <a16:creationId xmlns:a16="http://schemas.microsoft.com/office/drawing/2014/main" id="{C8DCECE4-F2B8-E18E-060D-398CE6190EA5}"/>
+              </a:ext>
+            </a:extLst>
+          </p:cNvPr>
+          <p:cNvSpPr/>
+          <p:nvPr/>
+        </p:nvSpPr>
+        <p:spPr>
+          <a:xfrm>
+            <a:off x="6912671" y="1076389"/>
+            <a:ext cx="900953" cy="900953"/>
+          </a:xfrm>
+          <a:prstGeom prst="ellipse">
+            <a:avLst/>
+          </a:prstGeom>
+          <a:solidFill>
+            <a:schemeClr val="bg1"/>
+          </a:solidFill>
+          <a:ln w="57150">
+            <a:solidFill>
+              <a:schemeClr val="accent2"/>
+            </a:solidFill>
+          </a:ln>
+        </p:spPr>
+        <p:style>
+          <a:lnRef idx="2">
+            <a:schemeClr val="accent1">
+              <a:shade val="50000"/>
+            </a:schemeClr>
+          </a:lnRef>
+          <a:fillRef idx="1">
+            <a:schemeClr val="accent1"/>
+          </a:fillRef>
+          <a:effectRef idx="0">
+            <a:schemeClr val="accent1"/>
+          </a:effectRef>
+          <a:fontRef idx="minor">
+            <a:schemeClr val="lt1"/>
+          </a:fontRef>
+        </p:style>
+        <p:txBody>
+          <a:bodyPr rtlCol="0" anchor="ctr"/>
+          <a:lstStyle/>
+          <a:p>
+            <a:pPr algn="r"/>
+            <a:r>
+              <a:rPr lang="en-US" sz="3600" b="1" dirty="0">
+                <a:solidFill>
+                  <a:schemeClr val="tx1"/>
+                </a:solidFill>
+              </a:rPr>
+              <a:t>A</a:t>
+            </a:r>
+            <a:r>
+              <a:rPr lang="en-US" sz="3600" b="1" baseline="-25000" dirty="0">
+                <a:solidFill>
+                  <a:schemeClr val="tx1"/>
+                </a:solidFill>
+              </a:rPr>
+              <a:t>2</a:t>
+            </a:r>
+          </a:p>
+        </p:txBody>
+      </p:sp>
+      <p:sp>
+        <p:nvSpPr>
+          <p:cNvPr id="41" name="Oval 40">
+            <a:extLst>
+              <a:ext uri="{FF2B5EF4-FFF2-40B4-BE49-F238E27FC236}">
+                <a16:creationId xmlns:a16="http://schemas.microsoft.com/office/drawing/2014/main" id="{A3EA60BE-BE78-584D-1FEC-BD03E4606988}"/>
+              </a:ext>
+            </a:extLst>
+          </p:cNvPr>
+          <p:cNvSpPr/>
+          <p:nvPr/>
+        </p:nvSpPr>
+        <p:spPr>
+          <a:xfrm>
+            <a:off x="7266166" y="2955016"/>
+            <a:ext cx="900953" cy="900953"/>
+          </a:xfrm>
+          <a:prstGeom prst="ellipse">
+            <a:avLst/>
+          </a:prstGeom>
+          <a:solidFill>
+            <a:schemeClr val="bg1"/>
+          </a:solidFill>
+          <a:ln w="57150">
+            <a:solidFill>
+              <a:schemeClr val="accent2"/>
+            </a:solidFill>
+          </a:ln>
+        </p:spPr>
+        <p:style>
+          <a:lnRef idx="2">
+            <a:schemeClr val="accent1">
+              <a:shade val="50000"/>
+            </a:schemeClr>
+          </a:lnRef>
+          <a:fillRef idx="1">
+            <a:schemeClr val="accent1"/>
+          </a:fillRef>
+          <a:effectRef idx="0">
+            <a:schemeClr val="accent1"/>
+          </a:effectRef>
+          <a:fontRef idx="minor">
+            <a:schemeClr val="lt1"/>
+          </a:fontRef>
+        </p:style>
+        <p:txBody>
+          <a:bodyPr rtlCol="0" anchor="ctr"/>
+          <a:lstStyle/>
+          <a:p>
+            <a:pPr algn="r"/>
+            <a:r>
+              <a:rPr lang="en-US" sz="3600" b="1" dirty="0">
+                <a:solidFill>
+                  <a:schemeClr val="tx1"/>
+                </a:solidFill>
+              </a:rPr>
+              <a:t>A</a:t>
+            </a:r>
+            <a:r>
+              <a:rPr lang="en-US" sz="3600" b="1" baseline="-25000" dirty="0">
+                <a:solidFill>
+                  <a:schemeClr val="tx1"/>
+                </a:solidFill>
+              </a:rPr>
+              <a:t>3</a:t>
+            </a:r>
+          </a:p>
+        </p:txBody>
+      </p:sp>
+    </p:spTree>
+    <p:extLst>
+      <p:ext uri="{BB962C8B-B14F-4D97-AF65-F5344CB8AC3E}">
+        <p14:creationId xmlns:p14="http://schemas.microsoft.com/office/powerpoint/2010/main" val="2357344873"/>
+      </p:ext>
+    </p:extLst>
+  </p:cSld>
+  <p:clrMapOvr>
+    <a:masterClrMapping/>
+  </p:clrMapOvr>
+</p:sld>
+</file>
+
+<file path=ppt/slides/slide5.xml><?xml version="1.0" encoding="utf-8"?>
 <p:sld xmlns:a="http://schemas.openxmlformats.org/drawingml/2006/main" xmlns:r="http://schemas.openxmlformats.org/officeDocument/2006/relationships" xmlns:p="http://schemas.openxmlformats.org/presentationml/2006/main">
   <p:cSld>
     <p:spTree>

</xml_diff>